<commit_message>
fix some presentation error in ppt and update solr version to 4.5.1.
</commit_message>
<xml_diff>
--- a/Full-Text_Search/PPT/全文检索入门与实践.pptx
+++ b/Full-Text_Search/PPT/全文检索入门与实践.pptx
@@ -1937,55 +1937,55 @@
     </dgm:pt>
   </dgm:ptLst>
   <dgm:cxnLst>
-    <dgm:cxn modelId="{F296287D-92F1-4795-85A4-09EC5D99BCFD}" type="presOf" srcId="{AD852797-663B-40D8-BACB-2FD2F2A02723}" destId="{378A92BF-730C-4B89-A22F-11233B28DBA0}" srcOrd="0" destOrd="8" presId="urn:microsoft.com/office/officeart/2005/8/layout/hList6"/>
-    <dgm:cxn modelId="{E1CA47BF-CB7C-47DE-9455-DB8F1DF22ECE}" type="presOf" srcId="{42B7CB72-D4F2-4059-BE65-F22AE24E1C41}" destId="{D33D3E6E-2DAB-49D5-A22D-8A7AE2AF2386}" srcOrd="0" destOrd="0" presId="urn:microsoft.com/office/officeart/2005/8/layout/hList6"/>
-    <dgm:cxn modelId="{CC080D9A-5CC6-4DC5-8EC6-6ECC8DD3A9F0}" type="presOf" srcId="{BC996979-D47B-4F3F-ADD4-6983D3C51CEF}" destId="{DB81FC91-547D-4887-B40A-6CFA1C435ABC}" srcOrd="0" destOrd="4" presId="urn:microsoft.com/office/officeart/2005/8/layout/hList6"/>
-    <dgm:cxn modelId="{8A5070DB-635E-4649-9C72-A4890A6D391B}" srcId="{A417BD96-AAB1-435B-9E8C-E86E27030477}" destId="{4F772856-7ED5-4ED6-80BA-A14947D71C52}" srcOrd="2" destOrd="0" parTransId="{7C989469-504B-462A-B48A-0F628C075F01}" sibTransId="{65F4C01E-C1D4-42AD-AB9A-8EE6025F5C27}"/>
-    <dgm:cxn modelId="{8717CD77-A072-423F-A3A0-2E6C6F009F4E}" srcId="{A417BD96-AAB1-435B-9E8C-E86E27030477}" destId="{A971C5B9-0EA0-43A5-9F8F-CF713F586D01}" srcOrd="1" destOrd="0" parTransId="{FE8D45B2-B41F-47BF-9C94-C82A27D89F97}" sibTransId="{4AA94A0D-AF81-4257-A904-CA006C26DA39}"/>
-    <dgm:cxn modelId="{FB014557-F1E8-4144-BC6A-B5298627AD04}" type="presOf" srcId="{2482526B-B676-42F3-94C1-07B3B09077B3}" destId="{D33D3E6E-2DAB-49D5-A22D-8A7AE2AF2386}" srcOrd="0" destOrd="4" presId="urn:microsoft.com/office/officeart/2005/8/layout/hList6"/>
-    <dgm:cxn modelId="{01DC669F-9754-4284-A77E-E31ABE9265DD}" srcId="{1E68D6D6-8D7B-46AD-90C4-65A938BB5C8A}" destId="{9DF16E84-4124-48A7-93D9-FCAF0F0335F8}" srcOrd="4" destOrd="0" parTransId="{AB0FE13C-5806-4A98-9AFB-E4A90BD2CA72}" sibTransId="{0603E359-51C3-4730-8424-3AD39D78054A}"/>
+    <dgm:cxn modelId="{05D4FEF0-4C72-435A-8ED8-528EFEC03780}" srcId="{7ED83C5F-20B4-45CB-9739-7440B3DC0A86}" destId="{1E68D6D6-8D7B-46AD-90C4-65A938BB5C8A}" srcOrd="0" destOrd="0" parTransId="{683277BE-FA34-480C-80EE-5362E1AF25DC}" sibTransId="{16E173C1-0A6D-4EC8-86C4-B4FFA2FCB811}"/>
+    <dgm:cxn modelId="{1EF248AA-DC77-499E-9EAF-EB8D2D2856C7}" srcId="{42B7CB72-D4F2-4059-BE65-F22AE24E1C41}" destId="{51E82ECE-F621-411A-81EB-C98BAA570799}" srcOrd="0" destOrd="0" parTransId="{E4764083-F814-4D3E-8A68-C2EC0709EF3E}" sibTransId="{99392818-C4DA-473D-8A33-6052651E0EDB}"/>
+    <dgm:cxn modelId="{74D6647F-49FD-4D47-A30E-CE7B3F456D97}" srcId="{1E68D6D6-8D7B-46AD-90C4-65A938BB5C8A}" destId="{75A91B37-FAC7-4295-8E9D-65784DC854CB}" srcOrd="0" destOrd="0" parTransId="{8D4DA750-B67B-418D-95CD-0209E3C4CE30}" sibTransId="{16AF249A-B97A-45B4-B754-9BB7847B6ED5}"/>
     <dgm:cxn modelId="{F43A83D6-CA93-4988-AE7B-917B6D3DD2BC}" srcId="{42B7CB72-D4F2-4059-BE65-F22AE24E1C41}" destId="{82C92D4A-BC39-4CAD-ADD6-23208CF33303}" srcOrd="1" destOrd="0" parTransId="{EC14CCEC-80A8-487E-9753-515E05263F74}" sibTransId="{A1EE2F41-0E1C-45F8-A54E-82A189CF63A5}"/>
+    <dgm:cxn modelId="{4DA4242E-60D4-465E-ABF2-4F32CB937986}" type="presOf" srcId="{528753BF-2EE3-42CB-A681-2D8933FDD593}" destId="{D33D3E6E-2DAB-49D5-A22D-8A7AE2AF2386}" srcOrd="0" destOrd="7" presId="urn:microsoft.com/office/officeart/2005/8/layout/hList6"/>
+    <dgm:cxn modelId="{6E34588B-5785-47CE-96B9-77D3F6C1C3EC}" type="presOf" srcId="{3CE69326-247D-433E-ADCB-7B2926E38D85}" destId="{378A92BF-730C-4B89-A22F-11233B28DBA0}" srcOrd="0" destOrd="4" presId="urn:microsoft.com/office/officeart/2005/8/layout/hList6"/>
+    <dgm:cxn modelId="{C19DD70A-50E5-41CD-B0CD-1D1CC7432AF9}" type="presOf" srcId="{82C92D4A-BC39-4CAD-ADD6-23208CF33303}" destId="{D33D3E6E-2DAB-49D5-A22D-8A7AE2AF2386}" srcOrd="0" destOrd="2" presId="urn:microsoft.com/office/officeart/2005/8/layout/hList6"/>
+    <dgm:cxn modelId="{82C9C916-C632-48CA-BC34-61A3F6316258}" type="presOf" srcId="{9DF16E84-4124-48A7-93D9-FCAF0F0335F8}" destId="{DB81FC91-547D-4887-B40A-6CFA1C435ABC}" srcOrd="0" destOrd="5" presId="urn:microsoft.com/office/officeart/2005/8/layout/hList6"/>
     <dgm:cxn modelId="{E3CE7052-491F-4B6B-83BA-83D68FD7E6B1}" srcId="{A417BD96-AAB1-435B-9E8C-E86E27030477}" destId="{3CE69326-247D-433E-ADCB-7B2926E38D85}" srcOrd="3" destOrd="0" parTransId="{C87109F6-8182-47D9-B14A-F565A330ABC3}" sibTransId="{20A5CA2E-225A-48C7-9B47-A4040396D9CC}"/>
-    <dgm:cxn modelId="{74D6647F-49FD-4D47-A30E-CE7B3F456D97}" srcId="{1E68D6D6-8D7B-46AD-90C4-65A938BB5C8A}" destId="{75A91B37-FAC7-4295-8E9D-65784DC854CB}" srcOrd="0" destOrd="0" parTransId="{8D4DA750-B67B-418D-95CD-0209E3C4CE30}" sibTransId="{16AF249A-B97A-45B4-B754-9BB7847B6ED5}"/>
-    <dgm:cxn modelId="{B51E76B6-59EA-4182-95EC-8EBAF018CFF5}" type="presOf" srcId="{7ED83C5F-20B4-45CB-9739-7440B3DC0A86}" destId="{AC2181AB-8547-43ED-BD14-63E88DCAB410}" srcOrd="0" destOrd="0" presId="urn:microsoft.com/office/officeart/2005/8/layout/hList6"/>
+    <dgm:cxn modelId="{A371FE2B-5684-4CC3-BCC2-938042AEF0A0}" srcId="{A417BD96-AAB1-435B-9E8C-E86E27030477}" destId="{32158258-C56C-4A2A-BFCF-E78B37AEF4DD}" srcOrd="5" destOrd="0" parTransId="{CFA2D5BB-5C85-49D2-9F20-650329DF30E4}" sibTransId="{8F4BA558-0549-41D0-8C32-FF1949FEE7EC}"/>
+    <dgm:cxn modelId="{0FC61371-B199-4A09-821C-C9C32537F592}" srcId="{A417BD96-AAB1-435B-9E8C-E86E27030477}" destId="{E93F7914-11FE-4465-9592-60E0999A9B8F}" srcOrd="6" destOrd="0" parTransId="{7C020B38-F1F9-4621-B34F-DF5A1B482941}" sibTransId="{F8CCF9D2-4835-426F-B1A9-B6EBADF6481D}"/>
     <dgm:cxn modelId="{EE8090DE-CAAA-4929-84A2-9DF56BD841F3}" srcId="{A417BD96-AAB1-435B-9E8C-E86E27030477}" destId="{321D9FFA-0154-47B8-BCE8-03EEBE5CF706}" srcOrd="4" destOrd="0" parTransId="{DC761916-D7C6-45A2-8B41-57F39D6AD941}" sibTransId="{7C5C8C2F-C177-45A0-B67D-308C826FE33E}"/>
-    <dgm:cxn modelId="{405CB256-0FEC-464B-95B7-054A7FCBA1F8}" type="presOf" srcId="{A971C5B9-0EA0-43A5-9F8F-CF713F586D01}" destId="{378A92BF-730C-4B89-A22F-11233B28DBA0}" srcOrd="0" destOrd="2" presId="urn:microsoft.com/office/officeart/2005/8/layout/hList6"/>
+    <dgm:cxn modelId="{7DA6B1B0-FDF7-46AA-889F-AD48F1091692}" srcId="{42B7CB72-D4F2-4059-BE65-F22AE24E1C41}" destId="{2482526B-B676-42F3-94C1-07B3B09077B3}" srcOrd="3" destOrd="0" parTransId="{AD9BB8D5-2C50-4B9F-8CA5-3A5D31307D8A}" sibTransId="{1A637CB1-9D4D-439C-BF5C-DA087B3A3C3D}"/>
+    <dgm:cxn modelId="{6DC344F6-1876-41D9-8E66-93734F10D750}" srcId="{42B7CB72-D4F2-4059-BE65-F22AE24E1C41}" destId="{528753BF-2EE3-42CB-A681-2D8933FDD593}" srcOrd="6" destOrd="0" parTransId="{C16C170E-6B88-475B-8AF5-EE85DA3DCCDE}" sibTransId="{F396871F-AED1-4AB3-8AAC-6BAB3FFB57C9}"/>
     <dgm:cxn modelId="{8024D740-B65F-4F30-B792-A7EAB02603C6}" srcId="{1E68D6D6-8D7B-46AD-90C4-65A938BB5C8A}" destId="{BC996979-D47B-4F3F-ADD4-6983D3C51CEF}" srcOrd="3" destOrd="0" parTransId="{3D22AD75-3233-4BC4-A212-1CAC04849314}" sibTransId="{F385BF18-706E-4246-ACA2-863F1DEA88D7}"/>
+    <dgm:cxn modelId="{6CE33CD9-58BE-48D9-948B-250A03D47D15}" type="presOf" srcId="{85E5C8DC-2232-4CD0-A348-4E92EEA68D98}" destId="{D33D3E6E-2DAB-49D5-A22D-8A7AE2AF2386}" srcOrd="0" destOrd="3" presId="urn:microsoft.com/office/officeart/2005/8/layout/hList6"/>
+    <dgm:cxn modelId="{037399CE-3737-4166-81E5-2382E0876798}" type="presOf" srcId="{279E0C1F-CFA7-403D-94C8-0CF0930A2A77}" destId="{D33D3E6E-2DAB-49D5-A22D-8A7AE2AF2386}" srcOrd="0" destOrd="6" presId="urn:microsoft.com/office/officeart/2005/8/layout/hList6"/>
+    <dgm:cxn modelId="{3F716999-D407-4B6C-9DFE-35F11896B45B}" srcId="{7ED83C5F-20B4-45CB-9739-7440B3DC0A86}" destId="{A417BD96-AAB1-435B-9E8C-E86E27030477}" srcOrd="2" destOrd="0" parTransId="{8D5380D5-6C8A-42B2-9F8F-A0D20EE22D7C}" sibTransId="{18CA8202-3404-4E09-BA90-8FB9C121C8B1}"/>
+    <dgm:cxn modelId="{B6BF4652-22EF-438E-87B4-11DC456B5C6B}" type="presOf" srcId="{32158258-C56C-4A2A-BFCF-E78B37AEF4DD}" destId="{378A92BF-730C-4B89-A22F-11233B28DBA0}" srcOrd="0" destOrd="6" presId="urn:microsoft.com/office/officeart/2005/8/layout/hList6"/>
+    <dgm:cxn modelId="{EE9272EE-552E-4BAD-8EF7-8B1882AC9515}" type="presOf" srcId="{E93F7914-11FE-4465-9592-60E0999A9B8F}" destId="{378A92BF-730C-4B89-A22F-11233B28DBA0}" srcOrd="0" destOrd="7" presId="urn:microsoft.com/office/officeart/2005/8/layout/hList6"/>
     <dgm:cxn modelId="{DF9DF8E3-AC9F-4E35-8D19-15F0604BABBD}" srcId="{42B7CB72-D4F2-4059-BE65-F22AE24E1C41}" destId="{3CBE9BB1-785B-489B-BDF3-0B85D2BBD29E}" srcOrd="4" destOrd="0" parTransId="{F586E160-A062-4B91-90A5-4ED833C4132F}" sibTransId="{B79A4D3D-C019-4290-9D64-F59A253540AB}"/>
-    <dgm:cxn modelId="{6CE33CD9-58BE-48D9-948B-250A03D47D15}" type="presOf" srcId="{85E5C8DC-2232-4CD0-A348-4E92EEA68D98}" destId="{D33D3E6E-2DAB-49D5-A22D-8A7AE2AF2386}" srcOrd="0" destOrd="3" presId="urn:microsoft.com/office/officeart/2005/8/layout/hList6"/>
-    <dgm:cxn modelId="{05D4FEF0-4C72-435A-8ED8-528EFEC03780}" srcId="{7ED83C5F-20B4-45CB-9739-7440B3DC0A86}" destId="{1E68D6D6-8D7B-46AD-90C4-65A938BB5C8A}" srcOrd="0" destOrd="0" parTransId="{683277BE-FA34-480C-80EE-5362E1AF25DC}" sibTransId="{16E173C1-0A6D-4EC8-86C4-B4FFA2FCB811}"/>
-    <dgm:cxn modelId="{597A73C3-B91E-4F56-9064-9057384691F3}" type="presOf" srcId="{75A91B37-FAC7-4295-8E9D-65784DC854CB}" destId="{DB81FC91-547D-4887-B40A-6CFA1C435ABC}" srcOrd="0" destOrd="1" presId="urn:microsoft.com/office/officeart/2005/8/layout/hList6"/>
-    <dgm:cxn modelId="{4DA4242E-60D4-465E-ABF2-4F32CB937986}" type="presOf" srcId="{528753BF-2EE3-42CB-A681-2D8933FDD593}" destId="{D33D3E6E-2DAB-49D5-A22D-8A7AE2AF2386}" srcOrd="0" destOrd="7" presId="urn:microsoft.com/office/officeart/2005/8/layout/hList6"/>
-    <dgm:cxn modelId="{5E5A2A5A-D499-4471-A016-5A076E449770}" type="presOf" srcId="{321D9FFA-0154-47B8-BCE8-03EEBE5CF706}" destId="{378A92BF-730C-4B89-A22F-11233B28DBA0}" srcOrd="0" destOrd="5" presId="urn:microsoft.com/office/officeart/2005/8/layout/hList6"/>
-    <dgm:cxn modelId="{B6BF4652-22EF-438E-87B4-11DC456B5C6B}" type="presOf" srcId="{32158258-C56C-4A2A-BFCF-E78B37AEF4DD}" destId="{378A92BF-730C-4B89-A22F-11233B28DBA0}" srcOrd="0" destOrd="6" presId="urn:microsoft.com/office/officeart/2005/8/layout/hList6"/>
-    <dgm:cxn modelId="{6E34588B-5785-47CE-96B9-77D3F6C1C3EC}" type="presOf" srcId="{3CE69326-247D-433E-ADCB-7B2926E38D85}" destId="{378A92BF-730C-4B89-A22F-11233B28DBA0}" srcOrd="0" destOrd="4" presId="urn:microsoft.com/office/officeart/2005/8/layout/hList6"/>
-    <dgm:cxn modelId="{F141DC20-D2E4-441B-B61A-AD70574A231E}" type="presOf" srcId="{4F772856-7ED5-4ED6-80BA-A14947D71C52}" destId="{378A92BF-730C-4B89-A22F-11233B28DBA0}" srcOrd="0" destOrd="3" presId="urn:microsoft.com/office/officeart/2005/8/layout/hList6"/>
-    <dgm:cxn modelId="{41CF89B3-DC3D-4DB0-BD96-5FD1ED79DA8A}" srcId="{A417BD96-AAB1-435B-9E8C-E86E27030477}" destId="{AD852797-663B-40D8-BACB-2FD2F2A02723}" srcOrd="7" destOrd="0" parTransId="{046F79DA-5796-4605-82D1-9BBC8CB2FBB7}" sibTransId="{5755668E-5D2B-4A4A-9173-C57815E18FD0}"/>
-    <dgm:cxn modelId="{A371FE2B-5684-4CC3-BCC2-938042AEF0A0}" srcId="{A417BD96-AAB1-435B-9E8C-E86E27030477}" destId="{32158258-C56C-4A2A-BFCF-E78B37AEF4DD}" srcOrd="5" destOrd="0" parTransId="{CFA2D5BB-5C85-49D2-9F20-650329DF30E4}" sibTransId="{8F4BA558-0549-41D0-8C32-FF1949FEE7EC}"/>
-    <dgm:cxn modelId="{BFE69754-216A-43CB-93FB-3805F495DD50}" srcId="{1E68D6D6-8D7B-46AD-90C4-65A938BB5C8A}" destId="{44BA54C5-1613-421E-8211-67FA2A4E5F4F}" srcOrd="1" destOrd="0" parTransId="{0F4BC458-C794-4572-9F8E-5BCC16F9D739}" sibTransId="{EED60C31-43B3-46C9-A30E-B960E01F85EA}"/>
-    <dgm:cxn modelId="{3CE5F3B4-E08A-46D1-A0A0-712031519D9B}" srcId="{1E68D6D6-8D7B-46AD-90C4-65A938BB5C8A}" destId="{F62EA030-EF4C-4264-9187-29425B72A67D}" srcOrd="5" destOrd="0" parTransId="{DBC45882-7848-4886-B33D-6C1C075D0A1E}" sibTransId="{F2651D65-28EB-493C-84FF-F3198427E500}"/>
-    <dgm:cxn modelId="{B620D70C-BCB0-4DA3-8DDC-0738DCC56BE4}" srcId="{42B7CB72-D4F2-4059-BE65-F22AE24E1C41}" destId="{279E0C1F-CFA7-403D-94C8-0CF0930A2A77}" srcOrd="5" destOrd="0" parTransId="{B64B0D23-CC46-4147-B617-F785F58EC3B6}" sibTransId="{5E4E1F76-5B6F-43EF-B3E8-C3171F785280}"/>
+    <dgm:cxn modelId="{7633124D-A744-4D96-A024-9550905C73BD}" type="presOf" srcId="{F62EA030-EF4C-4264-9187-29425B72A67D}" destId="{DB81FC91-547D-4887-B40A-6CFA1C435ABC}" srcOrd="0" destOrd="6" presId="urn:microsoft.com/office/officeart/2005/8/layout/hList6"/>
     <dgm:cxn modelId="{DC6FF33C-6C59-42DD-94D2-BD0875BE5CF5}" srcId="{A417BD96-AAB1-435B-9E8C-E86E27030477}" destId="{5449584D-91EF-47DA-9175-8794495DF361}" srcOrd="0" destOrd="0" parTransId="{1A77076D-D984-42A5-96B6-6186C9EA1DBB}" sibTransId="{AD328561-6D01-4F2B-915A-0296052D2738}"/>
     <dgm:cxn modelId="{4409EEA9-177A-412F-BDA8-90DACB17DEA7}" type="presOf" srcId="{A417BD96-AAB1-435B-9E8C-E86E27030477}" destId="{378A92BF-730C-4B89-A22F-11233B28DBA0}" srcOrd="0" destOrd="0" presId="urn:microsoft.com/office/officeart/2005/8/layout/hList6"/>
+    <dgm:cxn modelId="{CC080D9A-5CC6-4DC5-8EC6-6ECC8DD3A9F0}" type="presOf" srcId="{BC996979-D47B-4F3F-ADD4-6983D3C51CEF}" destId="{DB81FC91-547D-4887-B40A-6CFA1C435ABC}" srcOrd="0" destOrd="4" presId="urn:microsoft.com/office/officeart/2005/8/layout/hList6"/>
+    <dgm:cxn modelId="{3CE5F3B4-E08A-46D1-A0A0-712031519D9B}" srcId="{1E68D6D6-8D7B-46AD-90C4-65A938BB5C8A}" destId="{F62EA030-EF4C-4264-9187-29425B72A67D}" srcOrd="5" destOrd="0" parTransId="{DBC45882-7848-4886-B33D-6C1C075D0A1E}" sibTransId="{F2651D65-28EB-493C-84FF-F3198427E500}"/>
+    <dgm:cxn modelId="{BFE69754-216A-43CB-93FB-3805F495DD50}" srcId="{1E68D6D6-8D7B-46AD-90C4-65A938BB5C8A}" destId="{44BA54C5-1613-421E-8211-67FA2A4E5F4F}" srcOrd="1" destOrd="0" parTransId="{0F4BC458-C794-4572-9F8E-5BCC16F9D739}" sibTransId="{EED60C31-43B3-46C9-A30E-B960E01F85EA}"/>
+    <dgm:cxn modelId="{77FB7E20-8FDD-44AD-95DE-F2013A6E2977}" srcId="{7ED83C5F-20B4-45CB-9739-7440B3DC0A86}" destId="{42B7CB72-D4F2-4059-BE65-F22AE24E1C41}" srcOrd="1" destOrd="0" parTransId="{E2D66B80-12E6-44DD-9796-288B4458BABF}" sibTransId="{F1F61C7C-3030-4AFA-83B1-8A242AD47A8A}"/>
+    <dgm:cxn modelId="{41CF89B3-DC3D-4DB0-BD96-5FD1ED79DA8A}" srcId="{A417BD96-AAB1-435B-9E8C-E86E27030477}" destId="{AD852797-663B-40D8-BACB-2FD2F2A02723}" srcOrd="7" destOrd="0" parTransId="{046F79DA-5796-4605-82D1-9BBC8CB2FBB7}" sibTransId="{5755668E-5D2B-4A4A-9173-C57815E18FD0}"/>
+    <dgm:cxn modelId="{F141DC20-D2E4-441B-B61A-AD70574A231E}" type="presOf" srcId="{4F772856-7ED5-4ED6-80BA-A14947D71C52}" destId="{378A92BF-730C-4B89-A22F-11233B28DBA0}" srcOrd="0" destOrd="3" presId="urn:microsoft.com/office/officeart/2005/8/layout/hList6"/>
+    <dgm:cxn modelId="{BDFF3871-145D-410A-8BF9-3C49242A79E3}" type="presOf" srcId="{0D84E0D9-7310-4F29-92E4-3B806AC71FEC}" destId="{DB81FC91-547D-4887-B40A-6CFA1C435ABC}" srcOrd="0" destOrd="3" presId="urn:microsoft.com/office/officeart/2005/8/layout/hList6"/>
+    <dgm:cxn modelId="{01DC669F-9754-4284-A77E-E31ABE9265DD}" srcId="{1E68D6D6-8D7B-46AD-90C4-65A938BB5C8A}" destId="{9DF16E84-4124-48A7-93D9-FCAF0F0335F8}" srcOrd="4" destOrd="0" parTransId="{AB0FE13C-5806-4A98-9AFB-E4A90BD2CA72}" sibTransId="{0603E359-51C3-4730-8424-3AD39D78054A}"/>
+    <dgm:cxn modelId="{E1CA47BF-CB7C-47DE-9455-DB8F1DF22ECE}" type="presOf" srcId="{42B7CB72-D4F2-4059-BE65-F22AE24E1C41}" destId="{D33D3E6E-2DAB-49D5-A22D-8A7AE2AF2386}" srcOrd="0" destOrd="0" presId="urn:microsoft.com/office/officeart/2005/8/layout/hList6"/>
+    <dgm:cxn modelId="{B51E76B6-59EA-4182-95EC-8EBAF018CFF5}" type="presOf" srcId="{7ED83C5F-20B4-45CB-9739-7440B3DC0A86}" destId="{AC2181AB-8547-43ED-BD14-63E88DCAB410}" srcOrd="0" destOrd="0" presId="urn:microsoft.com/office/officeart/2005/8/layout/hList6"/>
     <dgm:cxn modelId="{08A3493B-10C5-4BDE-8E4B-90F7ADE6A705}" type="presOf" srcId="{5449584D-91EF-47DA-9175-8794495DF361}" destId="{378A92BF-730C-4B89-A22F-11233B28DBA0}" srcOrd="0" destOrd="1" presId="urn:microsoft.com/office/officeart/2005/8/layout/hList6"/>
-    <dgm:cxn modelId="{7633124D-A744-4D96-A024-9550905C73BD}" type="presOf" srcId="{F62EA030-EF4C-4264-9187-29425B72A67D}" destId="{DB81FC91-547D-4887-B40A-6CFA1C435ABC}" srcOrd="0" destOrd="6" presId="urn:microsoft.com/office/officeart/2005/8/layout/hList6"/>
-    <dgm:cxn modelId="{77FB7E20-8FDD-44AD-95DE-F2013A6E2977}" srcId="{7ED83C5F-20B4-45CB-9739-7440B3DC0A86}" destId="{42B7CB72-D4F2-4059-BE65-F22AE24E1C41}" srcOrd="1" destOrd="0" parTransId="{E2D66B80-12E6-44DD-9796-288B4458BABF}" sibTransId="{F1F61C7C-3030-4AFA-83B1-8A242AD47A8A}"/>
-    <dgm:cxn modelId="{C19DD70A-50E5-41CD-B0CD-1D1CC7432AF9}" type="presOf" srcId="{82C92D4A-BC39-4CAD-ADD6-23208CF33303}" destId="{D33D3E6E-2DAB-49D5-A22D-8A7AE2AF2386}" srcOrd="0" destOrd="2" presId="urn:microsoft.com/office/officeart/2005/8/layout/hList6"/>
+    <dgm:cxn modelId="{10F6BF29-AF8D-4B77-BE08-0E3D98E2A668}" srcId="{1E68D6D6-8D7B-46AD-90C4-65A938BB5C8A}" destId="{0D84E0D9-7310-4F29-92E4-3B806AC71FEC}" srcOrd="2" destOrd="0" parTransId="{46AE85BB-72F8-4448-A684-84A15F821C5A}" sibTransId="{FB681033-0C72-493B-A622-8E20536F1F8F}"/>
+    <dgm:cxn modelId="{F296287D-92F1-4795-85A4-09EC5D99BCFD}" type="presOf" srcId="{AD852797-663B-40D8-BACB-2FD2F2A02723}" destId="{378A92BF-730C-4B89-A22F-11233B28DBA0}" srcOrd="0" destOrd="8" presId="urn:microsoft.com/office/officeart/2005/8/layout/hList6"/>
+    <dgm:cxn modelId="{FB014557-F1E8-4144-BC6A-B5298627AD04}" type="presOf" srcId="{2482526B-B676-42F3-94C1-07B3B09077B3}" destId="{D33D3E6E-2DAB-49D5-A22D-8A7AE2AF2386}" srcOrd="0" destOrd="4" presId="urn:microsoft.com/office/officeart/2005/8/layout/hList6"/>
+    <dgm:cxn modelId="{8A5070DB-635E-4649-9C72-A4890A6D391B}" srcId="{A417BD96-AAB1-435B-9E8C-E86E27030477}" destId="{4F772856-7ED5-4ED6-80BA-A14947D71C52}" srcOrd="2" destOrd="0" parTransId="{7C989469-504B-462A-B48A-0F628C075F01}" sibTransId="{65F4C01E-C1D4-42AD-AB9A-8EE6025F5C27}"/>
+    <dgm:cxn modelId="{39AB66EC-220E-4F5B-B2C9-32CFFC4CD04F}" srcId="{42B7CB72-D4F2-4059-BE65-F22AE24E1C41}" destId="{85E5C8DC-2232-4CD0-A348-4E92EEA68D98}" srcOrd="2" destOrd="0" parTransId="{D2B23653-F2C9-4EB0-A04B-17D4C28C7B06}" sibTransId="{4A32B367-0832-42F4-A46A-29897D89D481}"/>
+    <dgm:cxn modelId="{B620D70C-BCB0-4DA3-8DDC-0738DCC56BE4}" srcId="{42B7CB72-D4F2-4059-BE65-F22AE24E1C41}" destId="{279E0C1F-CFA7-403D-94C8-0CF0930A2A77}" srcOrd="5" destOrd="0" parTransId="{B64B0D23-CC46-4147-B617-F785F58EC3B6}" sibTransId="{5E4E1F76-5B6F-43EF-B3E8-C3171F785280}"/>
+    <dgm:cxn modelId="{5E5A2A5A-D499-4471-A016-5A076E449770}" type="presOf" srcId="{321D9FFA-0154-47B8-BCE8-03EEBE5CF706}" destId="{378A92BF-730C-4B89-A22F-11233B28DBA0}" srcOrd="0" destOrd="5" presId="urn:microsoft.com/office/officeart/2005/8/layout/hList6"/>
+    <dgm:cxn modelId="{597A73C3-B91E-4F56-9064-9057384691F3}" type="presOf" srcId="{75A91B37-FAC7-4295-8E9D-65784DC854CB}" destId="{DB81FC91-547D-4887-B40A-6CFA1C435ABC}" srcOrd="0" destOrd="1" presId="urn:microsoft.com/office/officeart/2005/8/layout/hList6"/>
+    <dgm:cxn modelId="{56BFE388-4632-4725-BCC1-82794AF680B3}" type="presOf" srcId="{3CBE9BB1-785B-489B-BDF3-0B85D2BBD29E}" destId="{D33D3E6E-2DAB-49D5-A22D-8A7AE2AF2386}" srcOrd="0" destOrd="5" presId="urn:microsoft.com/office/officeart/2005/8/layout/hList6"/>
+    <dgm:cxn modelId="{6BD94F66-0C67-4170-A36B-49BF0A715490}" type="presOf" srcId="{51E82ECE-F621-411A-81EB-C98BAA570799}" destId="{D33D3E6E-2DAB-49D5-A22D-8A7AE2AF2386}" srcOrd="0" destOrd="1" presId="urn:microsoft.com/office/officeart/2005/8/layout/hList6"/>
     <dgm:cxn modelId="{6F23BF3C-89E6-4FDC-A321-AC1357A7F17E}" type="presOf" srcId="{44BA54C5-1613-421E-8211-67FA2A4E5F4F}" destId="{DB81FC91-547D-4887-B40A-6CFA1C435ABC}" srcOrd="0" destOrd="2" presId="urn:microsoft.com/office/officeart/2005/8/layout/hList6"/>
-    <dgm:cxn modelId="{BDFF3871-145D-410A-8BF9-3C49242A79E3}" type="presOf" srcId="{0D84E0D9-7310-4F29-92E4-3B806AC71FEC}" destId="{DB81FC91-547D-4887-B40A-6CFA1C435ABC}" srcOrd="0" destOrd="3" presId="urn:microsoft.com/office/officeart/2005/8/layout/hList6"/>
-    <dgm:cxn modelId="{56BFE388-4632-4725-BCC1-82794AF680B3}" type="presOf" srcId="{3CBE9BB1-785B-489B-BDF3-0B85D2BBD29E}" destId="{D33D3E6E-2DAB-49D5-A22D-8A7AE2AF2386}" srcOrd="0" destOrd="5" presId="urn:microsoft.com/office/officeart/2005/8/layout/hList6"/>
-    <dgm:cxn modelId="{0FC61371-B199-4A09-821C-C9C32537F592}" srcId="{A417BD96-AAB1-435B-9E8C-E86E27030477}" destId="{E93F7914-11FE-4465-9592-60E0999A9B8F}" srcOrd="6" destOrd="0" parTransId="{7C020B38-F1F9-4621-B34F-DF5A1B482941}" sibTransId="{F8CCF9D2-4835-426F-B1A9-B6EBADF6481D}"/>
-    <dgm:cxn modelId="{10F6BF29-AF8D-4B77-BE08-0E3D98E2A668}" srcId="{1E68D6D6-8D7B-46AD-90C4-65A938BB5C8A}" destId="{0D84E0D9-7310-4F29-92E4-3B806AC71FEC}" srcOrd="2" destOrd="0" parTransId="{46AE85BB-72F8-4448-A684-84A15F821C5A}" sibTransId="{FB681033-0C72-493B-A622-8E20536F1F8F}"/>
-    <dgm:cxn modelId="{1EF248AA-DC77-499E-9EAF-EB8D2D2856C7}" srcId="{42B7CB72-D4F2-4059-BE65-F22AE24E1C41}" destId="{51E82ECE-F621-411A-81EB-C98BAA570799}" srcOrd="0" destOrd="0" parTransId="{E4764083-F814-4D3E-8A68-C2EC0709EF3E}" sibTransId="{99392818-C4DA-473D-8A33-6052651E0EDB}"/>
-    <dgm:cxn modelId="{82C9C916-C632-48CA-BC34-61A3F6316258}" type="presOf" srcId="{9DF16E84-4124-48A7-93D9-FCAF0F0335F8}" destId="{DB81FC91-547D-4887-B40A-6CFA1C435ABC}" srcOrd="0" destOrd="5" presId="urn:microsoft.com/office/officeart/2005/8/layout/hList6"/>
     <dgm:cxn modelId="{A9E4B212-54EE-45AE-9ECF-12DFE9D8C900}" type="presOf" srcId="{1E68D6D6-8D7B-46AD-90C4-65A938BB5C8A}" destId="{DB81FC91-547D-4887-B40A-6CFA1C435ABC}" srcOrd="0" destOrd="0" presId="urn:microsoft.com/office/officeart/2005/8/layout/hList6"/>
-    <dgm:cxn modelId="{7DA6B1B0-FDF7-46AA-889F-AD48F1091692}" srcId="{42B7CB72-D4F2-4059-BE65-F22AE24E1C41}" destId="{2482526B-B676-42F3-94C1-07B3B09077B3}" srcOrd="3" destOrd="0" parTransId="{AD9BB8D5-2C50-4B9F-8CA5-3A5D31307D8A}" sibTransId="{1A637CB1-9D4D-439C-BF5C-DA087B3A3C3D}"/>
-    <dgm:cxn modelId="{6BD94F66-0C67-4170-A36B-49BF0A715490}" type="presOf" srcId="{51E82ECE-F621-411A-81EB-C98BAA570799}" destId="{D33D3E6E-2DAB-49D5-A22D-8A7AE2AF2386}" srcOrd="0" destOrd="1" presId="urn:microsoft.com/office/officeart/2005/8/layout/hList6"/>
-    <dgm:cxn modelId="{037399CE-3737-4166-81E5-2382E0876798}" type="presOf" srcId="{279E0C1F-CFA7-403D-94C8-0CF0930A2A77}" destId="{D33D3E6E-2DAB-49D5-A22D-8A7AE2AF2386}" srcOrd="0" destOrd="6" presId="urn:microsoft.com/office/officeart/2005/8/layout/hList6"/>
-    <dgm:cxn modelId="{39AB66EC-220E-4F5B-B2C9-32CFFC4CD04F}" srcId="{42B7CB72-D4F2-4059-BE65-F22AE24E1C41}" destId="{85E5C8DC-2232-4CD0-A348-4E92EEA68D98}" srcOrd="2" destOrd="0" parTransId="{D2B23653-F2C9-4EB0-A04B-17D4C28C7B06}" sibTransId="{4A32B367-0832-42F4-A46A-29897D89D481}"/>
-    <dgm:cxn modelId="{6DC344F6-1876-41D9-8E66-93734F10D750}" srcId="{42B7CB72-D4F2-4059-BE65-F22AE24E1C41}" destId="{528753BF-2EE3-42CB-A681-2D8933FDD593}" srcOrd="6" destOrd="0" parTransId="{C16C170E-6B88-475B-8AF5-EE85DA3DCCDE}" sibTransId="{F396871F-AED1-4AB3-8AAC-6BAB3FFB57C9}"/>
-    <dgm:cxn modelId="{3F716999-D407-4B6C-9DFE-35F11896B45B}" srcId="{7ED83C5F-20B4-45CB-9739-7440B3DC0A86}" destId="{A417BD96-AAB1-435B-9E8C-E86E27030477}" srcOrd="2" destOrd="0" parTransId="{8D5380D5-6C8A-42B2-9F8F-A0D20EE22D7C}" sibTransId="{18CA8202-3404-4E09-BA90-8FB9C121C8B1}"/>
-    <dgm:cxn modelId="{EE9272EE-552E-4BAD-8EF7-8B1882AC9515}" type="presOf" srcId="{E93F7914-11FE-4465-9592-60E0999A9B8F}" destId="{378A92BF-730C-4B89-A22F-11233B28DBA0}" srcOrd="0" destOrd="7" presId="urn:microsoft.com/office/officeart/2005/8/layout/hList6"/>
+    <dgm:cxn modelId="{405CB256-0FEC-464B-95B7-054A7FCBA1F8}" type="presOf" srcId="{A971C5B9-0EA0-43A5-9F8F-CF713F586D01}" destId="{378A92BF-730C-4B89-A22F-11233B28DBA0}" srcOrd="0" destOrd="2" presId="urn:microsoft.com/office/officeart/2005/8/layout/hList6"/>
+    <dgm:cxn modelId="{8717CD77-A072-423F-A3A0-2E6C6F009F4E}" srcId="{A417BD96-AAB1-435B-9E8C-E86E27030477}" destId="{A971C5B9-0EA0-43A5-9F8F-CF713F586D01}" srcOrd="1" destOrd="0" parTransId="{FE8D45B2-B41F-47BF-9C94-C82A27D89F97}" sibTransId="{4AA94A0D-AF81-4257-A904-CA006C26DA39}"/>
     <dgm:cxn modelId="{9BC964C5-62A0-4C70-BB5A-79453D32C380}" type="presParOf" srcId="{AC2181AB-8547-43ED-BD14-63E88DCAB410}" destId="{DB81FC91-547D-4887-B40A-6CFA1C435ABC}" srcOrd="0" destOrd="0" presId="urn:microsoft.com/office/officeart/2005/8/layout/hList6"/>
     <dgm:cxn modelId="{E7C74461-63F4-4BFF-A400-15CDBF064778}" type="presParOf" srcId="{AC2181AB-8547-43ED-BD14-63E88DCAB410}" destId="{ABFEFE6B-76FA-46AA-BB18-B35D6C2CAF9C}" srcOrd="1" destOrd="0" presId="urn:microsoft.com/office/officeart/2005/8/layout/hList6"/>
     <dgm:cxn modelId="{E131C541-D024-4E5E-8D28-B741B37896A8}" type="presParOf" srcId="{AC2181AB-8547-43ED-BD14-63E88DCAB410}" destId="{D33D3E6E-2DAB-49D5-A22D-8A7AE2AF2386}" srcOrd="2" destOrd="0" presId="urn:microsoft.com/office/officeart/2005/8/layout/hList6"/>
@@ -1996,7 +1996,7 @@
   <dgm:whole/>
   <dgm:extLst>
     <a:ext uri="http://schemas.microsoft.com/office/drawing/2008/diagram">
-      <dsp:dataModelExt xmlns:dsp="http://schemas.microsoft.com/office/drawing/2008/diagram" relId="rId6" minVer="http://schemas.openxmlformats.org/drawingml/2006/diagram"/>
+      <dsp:dataModelExt xmlns:dsp="http://schemas.microsoft.com/office/drawing/2008/diagram" relId="rId7" minVer="http://schemas.openxmlformats.org/drawingml/2006/diagram"/>
     </a:ext>
   </dgm:extLst>
 </dgm:dataModel>
@@ -2010,656 +2010,6 @@
       <dsp:cNvGrpSpPr/>
     </dsp:nvGrpSpPr>
     <dsp:grpSpPr/>
-    <dsp:sp modelId="{DB81FC91-547D-4887-B40A-6CFA1C435ABC}">
-      <dsp:nvSpPr>
-        <dsp:cNvPr id="0" name=""/>
-        <dsp:cNvSpPr/>
-      </dsp:nvSpPr>
-      <dsp:spPr>
-        <a:xfrm rot="16200000">
-          <a:off x="-956010" y="957014"/>
-          <a:ext cx="4525963" cy="2611933"/>
-        </a:xfrm>
-        <a:prstGeom prst="flowChartManualOperation">
-          <a:avLst/>
-        </a:prstGeom>
-        <a:solidFill>
-          <a:schemeClr val="accent1">
-            <a:hueOff val="0"/>
-            <a:satOff val="0"/>
-            <a:lumOff val="0"/>
-            <a:alphaOff val="0"/>
-          </a:schemeClr>
-        </a:solidFill>
-        <a:ln w="25400" cap="flat" cmpd="sng" algn="ctr">
-          <a:solidFill>
-            <a:schemeClr val="lt1">
-              <a:hueOff val="0"/>
-              <a:satOff val="0"/>
-              <a:lumOff val="0"/>
-              <a:alphaOff val="0"/>
-            </a:schemeClr>
-          </a:solidFill>
-          <a:prstDash val="solid"/>
-        </a:ln>
-        <a:effectLst/>
-      </dsp:spPr>
-      <dsp:style>
-        <a:lnRef idx="2">
-          <a:scrgbClr r="0" g="0" b="0"/>
-        </a:lnRef>
-        <a:fillRef idx="1">
-          <a:scrgbClr r="0" g="0" b="0"/>
-        </a:fillRef>
-        <a:effectRef idx="0">
-          <a:scrgbClr r="0" g="0" b="0"/>
-        </a:effectRef>
-        <a:fontRef idx="minor">
-          <a:schemeClr val="lt1"/>
-        </a:fontRef>
-      </dsp:style>
-      <dsp:txBody>
-        <a:bodyPr spcFirstLastPara="0" vert="horz" wrap="square" lIns="139700" tIns="0" rIns="140325" bIns="0" numCol="1" spcCol="1270" anchor="t" anchorCtr="0">
-          <a:noAutofit/>
-        </a:bodyPr>
-        <a:lstStyle/>
-        <a:p>
-          <a:pPr lvl="0" algn="l" defTabSz="977900">
-            <a:lnSpc>
-              <a:spcPct val="90000"/>
-            </a:lnSpc>
-            <a:spcBef>
-              <a:spcPct val="0"/>
-            </a:spcBef>
-            <a:spcAft>
-              <a:spcPct val="35000"/>
-            </a:spcAft>
-          </a:pPr>
-          <a:r>
-            <a:rPr lang="zh-CN" altLang="en-US" sz="2200" kern="1200" dirty="0" smtClean="0"/>
-            <a:t>语言类</a:t>
-          </a:r>
-          <a:endParaRPr lang="zh-CN" altLang="en-US" sz="2200" kern="1200" dirty="0"/>
-        </a:p>
-        <a:p>
-          <a:pPr marL="171450" lvl="1" indent="-171450" algn="l" defTabSz="755650">
-            <a:lnSpc>
-              <a:spcPct val="90000"/>
-            </a:lnSpc>
-            <a:spcBef>
-              <a:spcPct val="0"/>
-            </a:spcBef>
-            <a:spcAft>
-              <a:spcPct val="15000"/>
-            </a:spcAft>
-            <a:buChar char="••"/>
-          </a:pPr>
-          <a:r>
-            <a:rPr lang="en-US" altLang="zh-CN" sz="1700" kern="1200" dirty="0" smtClean="0"/>
-            <a:t>Java</a:t>
-          </a:r>
-          <a:r>
-            <a:rPr lang="zh-CN" altLang="en-US" sz="1700" kern="1200" dirty="0" smtClean="0"/>
-            <a:t>深入</a:t>
-          </a:r>
-          <a:endParaRPr lang="zh-CN" altLang="en-US" sz="1700" kern="1200" dirty="0"/>
-        </a:p>
-        <a:p>
-          <a:pPr marL="171450" lvl="1" indent="-171450" algn="l" defTabSz="755650">
-            <a:lnSpc>
-              <a:spcPct val="90000"/>
-            </a:lnSpc>
-            <a:spcBef>
-              <a:spcPct val="0"/>
-            </a:spcBef>
-            <a:spcAft>
-              <a:spcPct val="15000"/>
-            </a:spcAft>
-            <a:buChar char="••"/>
-          </a:pPr>
-          <a:r>
-            <a:rPr lang="en-US" altLang="zh-CN" sz="1700" kern="1200" dirty="0" smtClean="0"/>
-            <a:t>JS</a:t>
-          </a:r>
-          <a:r>
-            <a:rPr lang="zh-CN" altLang="en-US" sz="1700" kern="1200" dirty="0" smtClean="0"/>
-            <a:t>深入</a:t>
-          </a:r>
-          <a:endParaRPr lang="zh-CN" altLang="en-US" sz="1700" kern="1200" dirty="0"/>
-        </a:p>
-        <a:p>
-          <a:pPr marL="171450" lvl="1" indent="-171450" algn="l" defTabSz="755650">
-            <a:lnSpc>
-              <a:spcPct val="90000"/>
-            </a:lnSpc>
-            <a:spcBef>
-              <a:spcPct val="0"/>
-            </a:spcBef>
-            <a:spcAft>
-              <a:spcPct val="15000"/>
-            </a:spcAft>
-            <a:buChar char="••"/>
-          </a:pPr>
-          <a:r>
-            <a:rPr lang="en-US" altLang="zh-CN" sz="1700" kern="1200" dirty="0" smtClean="0"/>
-            <a:t>Python</a:t>
-          </a:r>
-          <a:endParaRPr lang="zh-CN" altLang="en-US" sz="1700" kern="1200" dirty="0"/>
-        </a:p>
-        <a:p>
-          <a:pPr marL="171450" lvl="1" indent="-171450" algn="l" defTabSz="755650">
-            <a:lnSpc>
-              <a:spcPct val="90000"/>
-            </a:lnSpc>
-            <a:spcBef>
-              <a:spcPct val="0"/>
-            </a:spcBef>
-            <a:spcAft>
-              <a:spcPct val="15000"/>
-            </a:spcAft>
-            <a:buChar char="••"/>
-          </a:pPr>
-          <a:r>
-            <a:rPr lang="en-US" sz="1700" kern="1200" dirty="0" err="1" smtClean="0"/>
-            <a:t>Scala</a:t>
-          </a:r>
-          <a:endParaRPr lang="zh-CN" altLang="en-US" sz="1700" kern="1200" dirty="0"/>
-        </a:p>
-        <a:p>
-          <a:pPr marL="171450" lvl="1" indent="-171450" algn="l" defTabSz="755650">
-            <a:lnSpc>
-              <a:spcPct val="90000"/>
-            </a:lnSpc>
-            <a:spcBef>
-              <a:spcPct val="0"/>
-            </a:spcBef>
-            <a:spcAft>
-              <a:spcPct val="15000"/>
-            </a:spcAft>
-            <a:buChar char="••"/>
-          </a:pPr>
-          <a:r>
-            <a:rPr lang="en-US" sz="1700" kern="1200" dirty="0" smtClean="0"/>
-            <a:t>Groovy</a:t>
-          </a:r>
-          <a:endParaRPr lang="zh-CN" altLang="en-US" sz="1700" kern="1200" dirty="0"/>
-        </a:p>
-        <a:p>
-          <a:pPr marL="171450" lvl="1" indent="-171450" algn="l" defTabSz="755650">
-            <a:lnSpc>
-              <a:spcPct val="90000"/>
-            </a:lnSpc>
-            <a:spcBef>
-              <a:spcPct val="0"/>
-            </a:spcBef>
-            <a:spcAft>
-              <a:spcPct val="15000"/>
-            </a:spcAft>
-            <a:buChar char="••"/>
-          </a:pPr>
-          <a:r>
-            <a:rPr lang="en-US" altLang="zh-CN" sz="1700" kern="1200" dirty="0" smtClean="0"/>
-            <a:t>Go</a:t>
-          </a:r>
-          <a:endParaRPr lang="zh-CN" altLang="en-US" sz="1700" kern="1200" dirty="0"/>
-        </a:p>
-      </dsp:txBody>
-      <dsp:txXfrm rot="5400000">
-        <a:off x="1005" y="905192"/>
-        <a:ext cx="2611933" cy="2715577"/>
-      </dsp:txXfrm>
-    </dsp:sp>
-    <dsp:sp modelId="{D33D3E6E-2DAB-49D5-A22D-8A7AE2AF2386}">
-      <dsp:nvSpPr>
-        <dsp:cNvPr id="0" name=""/>
-        <dsp:cNvSpPr/>
-      </dsp:nvSpPr>
-      <dsp:spPr>
-        <a:xfrm rot="16200000">
-          <a:off x="1851818" y="957014"/>
-          <a:ext cx="4525963" cy="2611933"/>
-        </a:xfrm>
-        <a:prstGeom prst="flowChartManualOperation">
-          <a:avLst/>
-        </a:prstGeom>
-        <a:solidFill>
-          <a:schemeClr val="accent1">
-            <a:hueOff val="0"/>
-            <a:satOff val="0"/>
-            <a:lumOff val="0"/>
-            <a:alphaOff val="0"/>
-          </a:schemeClr>
-        </a:solidFill>
-        <a:ln w="25400" cap="flat" cmpd="sng" algn="ctr">
-          <a:solidFill>
-            <a:schemeClr val="lt1">
-              <a:hueOff val="0"/>
-              <a:satOff val="0"/>
-              <a:lumOff val="0"/>
-              <a:alphaOff val="0"/>
-            </a:schemeClr>
-          </a:solidFill>
-          <a:prstDash val="solid"/>
-        </a:ln>
-        <a:effectLst/>
-      </dsp:spPr>
-      <dsp:style>
-        <a:lnRef idx="2">
-          <a:scrgbClr r="0" g="0" b="0"/>
-        </a:lnRef>
-        <a:fillRef idx="1">
-          <a:scrgbClr r="0" g="0" b="0"/>
-        </a:fillRef>
-        <a:effectRef idx="0">
-          <a:scrgbClr r="0" g="0" b="0"/>
-        </a:effectRef>
-        <a:fontRef idx="minor">
-          <a:schemeClr val="lt1"/>
-        </a:fontRef>
-      </dsp:style>
-      <dsp:txBody>
-        <a:bodyPr spcFirstLastPara="0" vert="horz" wrap="square" lIns="139700" tIns="0" rIns="140325" bIns="0" numCol="1" spcCol="1270" anchor="t" anchorCtr="0">
-          <a:noAutofit/>
-        </a:bodyPr>
-        <a:lstStyle/>
-        <a:p>
-          <a:pPr lvl="0" algn="l" defTabSz="977900">
-            <a:lnSpc>
-              <a:spcPct val="90000"/>
-            </a:lnSpc>
-            <a:spcBef>
-              <a:spcPct val="0"/>
-            </a:spcBef>
-            <a:spcAft>
-              <a:spcPct val="35000"/>
-            </a:spcAft>
-          </a:pPr>
-          <a:r>
-            <a:rPr lang="zh-CN" altLang="en-US" sz="2200" kern="1200" dirty="0" smtClean="0"/>
-            <a:t>框架</a:t>
-          </a:r>
-          <a:r>
-            <a:rPr lang="en-US" altLang="zh-CN" sz="2200" kern="1200" dirty="0" smtClean="0"/>
-            <a:t>&amp;</a:t>
-          </a:r>
-          <a:r>
-            <a:rPr lang="zh-CN" altLang="en-US" sz="2200" kern="1200" dirty="0" smtClean="0"/>
-            <a:t>环境类</a:t>
-          </a:r>
-          <a:endParaRPr lang="zh-CN" altLang="en-US" sz="2200" kern="1200" dirty="0"/>
-        </a:p>
-        <a:p>
-          <a:pPr marL="171450" lvl="1" indent="-171450" algn="l" defTabSz="755650">
-            <a:lnSpc>
-              <a:spcPct val="90000"/>
-            </a:lnSpc>
-            <a:spcBef>
-              <a:spcPct val="0"/>
-            </a:spcBef>
-            <a:spcAft>
-              <a:spcPct val="15000"/>
-            </a:spcAft>
-            <a:buChar char="••"/>
-          </a:pPr>
-          <a:r>
-            <a:rPr lang="en-US" altLang="zh-CN" sz="1700" kern="1200" dirty="0" err="1" smtClean="0"/>
-            <a:t>Hadoop</a:t>
-          </a:r>
-          <a:endParaRPr lang="zh-CN" altLang="en-US" sz="1700" kern="1200" dirty="0"/>
-        </a:p>
-        <a:p>
-          <a:pPr marL="171450" lvl="1" indent="-171450" algn="l" defTabSz="755650">
-            <a:lnSpc>
-              <a:spcPct val="90000"/>
-            </a:lnSpc>
-            <a:spcBef>
-              <a:spcPct val="0"/>
-            </a:spcBef>
-            <a:spcAft>
-              <a:spcPct val="15000"/>
-            </a:spcAft>
-            <a:buChar char="••"/>
-          </a:pPr>
-          <a:r>
-            <a:rPr lang="en-US" altLang="zh-CN" sz="1700" kern="1200" dirty="0" smtClean="0"/>
-            <a:t>Spring</a:t>
-          </a:r>
-          <a:r>
-            <a:rPr lang="zh-CN" altLang="en-US" sz="1700" kern="1200" dirty="0" smtClean="0"/>
-            <a:t>家族</a:t>
-          </a:r>
-          <a:endParaRPr lang="zh-CN" altLang="en-US" sz="1700" kern="1200" dirty="0"/>
-        </a:p>
-        <a:p>
-          <a:pPr marL="171450" lvl="1" indent="-171450" algn="l" defTabSz="755650">
-            <a:lnSpc>
-              <a:spcPct val="90000"/>
-            </a:lnSpc>
-            <a:spcBef>
-              <a:spcPct val="0"/>
-            </a:spcBef>
-            <a:spcAft>
-              <a:spcPct val="15000"/>
-            </a:spcAft>
-            <a:buChar char="••"/>
-          </a:pPr>
-          <a:r>
-            <a:rPr lang="en-US" altLang="zh-CN" sz="1700" kern="1200" dirty="0" err="1" smtClean="0"/>
-            <a:t>PhoneGap</a:t>
-          </a:r>
-          <a:endParaRPr lang="zh-CN" altLang="en-US" sz="1700" kern="1200" dirty="0"/>
-        </a:p>
-        <a:p>
-          <a:pPr marL="171450" lvl="1" indent="-171450" algn="l" defTabSz="755650">
-            <a:lnSpc>
-              <a:spcPct val="90000"/>
-            </a:lnSpc>
-            <a:spcBef>
-              <a:spcPct val="0"/>
-            </a:spcBef>
-            <a:spcAft>
-              <a:spcPct val="15000"/>
-            </a:spcAft>
-            <a:buChar char="••"/>
-          </a:pPr>
-          <a:r>
-            <a:rPr lang="en-US" altLang="en-US" sz="1700" kern="1200" dirty="0" err="1" smtClean="0"/>
-            <a:t>vert.x</a:t>
-          </a:r>
-          <a:endParaRPr lang="zh-CN" altLang="en-US" sz="1700" kern="1200" dirty="0"/>
-        </a:p>
-        <a:p>
-          <a:pPr marL="171450" lvl="1" indent="-171450" algn="l" defTabSz="755650">
-            <a:lnSpc>
-              <a:spcPct val="90000"/>
-            </a:lnSpc>
-            <a:spcBef>
-              <a:spcPct val="0"/>
-            </a:spcBef>
-            <a:spcAft>
-              <a:spcPct val="15000"/>
-            </a:spcAft>
-            <a:buChar char="••"/>
-          </a:pPr>
-          <a:r>
-            <a:rPr lang="en-US" altLang="zh-CN" sz="1700" kern="1200" dirty="0" err="1" smtClean="0"/>
-            <a:t>Nodejs</a:t>
-          </a:r>
-          <a:endParaRPr lang="zh-CN" altLang="en-US" sz="1700" kern="1200" dirty="0"/>
-        </a:p>
-        <a:p>
-          <a:pPr marL="171450" lvl="1" indent="-171450" algn="l" defTabSz="755650">
-            <a:lnSpc>
-              <a:spcPct val="90000"/>
-            </a:lnSpc>
-            <a:spcBef>
-              <a:spcPct val="0"/>
-            </a:spcBef>
-            <a:spcAft>
-              <a:spcPct val="15000"/>
-            </a:spcAft>
-            <a:buChar char="••"/>
-          </a:pPr>
-          <a:r>
-            <a:rPr lang="en-US" altLang="en-US" sz="1700" kern="1200" dirty="0" smtClean="0"/>
-            <a:t>Angular.js</a:t>
-          </a:r>
-          <a:endParaRPr lang="zh-CN" altLang="en-US" sz="1700" kern="1200" dirty="0"/>
-        </a:p>
-        <a:p>
-          <a:pPr marL="171450" lvl="1" indent="-171450" algn="l" defTabSz="755650">
-            <a:lnSpc>
-              <a:spcPct val="90000"/>
-            </a:lnSpc>
-            <a:spcBef>
-              <a:spcPct val="0"/>
-            </a:spcBef>
-            <a:spcAft>
-              <a:spcPct val="15000"/>
-            </a:spcAft>
-            <a:buChar char="••"/>
-          </a:pPr>
-          <a:r>
-            <a:rPr lang="en-US" altLang="zh-CN" sz="1700" kern="1200" dirty="0" err="1" smtClean="0"/>
-            <a:t>Django</a:t>
-          </a:r>
-          <a:endParaRPr lang="zh-CN" altLang="en-US" sz="1700" kern="1200" dirty="0"/>
-        </a:p>
-      </dsp:txBody>
-      <dsp:txXfrm rot="5400000">
-        <a:off x="2808833" y="905192"/>
-        <a:ext cx="2611933" cy="2715577"/>
-      </dsp:txXfrm>
-    </dsp:sp>
-    <dsp:sp modelId="{378A92BF-730C-4B89-A22F-11233B28DBA0}">
-      <dsp:nvSpPr>
-        <dsp:cNvPr id="0" name=""/>
-        <dsp:cNvSpPr/>
-      </dsp:nvSpPr>
-      <dsp:spPr>
-        <a:xfrm rot="16200000">
-          <a:off x="4659647" y="957014"/>
-          <a:ext cx="4525963" cy="2611933"/>
-        </a:xfrm>
-        <a:prstGeom prst="flowChartManualOperation">
-          <a:avLst/>
-        </a:prstGeom>
-        <a:solidFill>
-          <a:schemeClr val="accent1">
-            <a:hueOff val="0"/>
-            <a:satOff val="0"/>
-            <a:lumOff val="0"/>
-            <a:alphaOff val="0"/>
-          </a:schemeClr>
-        </a:solidFill>
-        <a:ln w="25400" cap="flat" cmpd="sng" algn="ctr">
-          <a:solidFill>
-            <a:schemeClr val="lt1">
-              <a:hueOff val="0"/>
-              <a:satOff val="0"/>
-              <a:lumOff val="0"/>
-              <a:alphaOff val="0"/>
-            </a:schemeClr>
-          </a:solidFill>
-          <a:prstDash val="solid"/>
-        </a:ln>
-        <a:effectLst/>
-      </dsp:spPr>
-      <dsp:style>
-        <a:lnRef idx="2">
-          <a:scrgbClr r="0" g="0" b="0"/>
-        </a:lnRef>
-        <a:fillRef idx="1">
-          <a:scrgbClr r="0" g="0" b="0"/>
-        </a:fillRef>
-        <a:effectRef idx="0">
-          <a:scrgbClr r="0" g="0" b="0"/>
-        </a:effectRef>
-        <a:fontRef idx="minor">
-          <a:schemeClr val="lt1"/>
-        </a:fontRef>
-      </dsp:style>
-      <dsp:txBody>
-        <a:bodyPr spcFirstLastPara="0" vert="horz" wrap="square" lIns="139700" tIns="0" rIns="140325" bIns="0" numCol="1" spcCol="1270" anchor="t" anchorCtr="0">
-          <a:noAutofit/>
-        </a:bodyPr>
-        <a:lstStyle/>
-        <a:p>
-          <a:pPr lvl="0" algn="l" defTabSz="977900">
-            <a:lnSpc>
-              <a:spcPct val="90000"/>
-            </a:lnSpc>
-            <a:spcBef>
-              <a:spcPct val="0"/>
-            </a:spcBef>
-            <a:spcAft>
-              <a:spcPct val="35000"/>
-            </a:spcAft>
-          </a:pPr>
-          <a:r>
-            <a:rPr lang="zh-CN" altLang="en-US" sz="2200" kern="1200" dirty="0" smtClean="0"/>
-            <a:t>设计架构类</a:t>
-          </a:r>
-          <a:endParaRPr lang="zh-CN" altLang="en-US" sz="2200" kern="1200" dirty="0"/>
-        </a:p>
-        <a:p>
-          <a:pPr marL="171450" lvl="1" indent="-171450" algn="l" defTabSz="755650">
-            <a:lnSpc>
-              <a:spcPct val="90000"/>
-            </a:lnSpc>
-            <a:spcBef>
-              <a:spcPct val="0"/>
-            </a:spcBef>
-            <a:spcAft>
-              <a:spcPct val="15000"/>
-            </a:spcAft>
-            <a:buChar char="••"/>
-          </a:pPr>
-          <a:r>
-            <a:rPr lang="en-US" altLang="zh-CN" sz="1700" kern="1200" dirty="0" smtClean="0"/>
-            <a:t>DDD</a:t>
-          </a:r>
-          <a:endParaRPr lang="zh-CN" altLang="en-US" sz="1700" kern="1200" dirty="0"/>
-        </a:p>
-        <a:p>
-          <a:pPr marL="171450" lvl="1" indent="-171450" algn="l" defTabSz="755650">
-            <a:lnSpc>
-              <a:spcPct val="90000"/>
-            </a:lnSpc>
-            <a:spcBef>
-              <a:spcPct val="0"/>
-            </a:spcBef>
-            <a:spcAft>
-              <a:spcPct val="15000"/>
-            </a:spcAft>
-            <a:buChar char="••"/>
-          </a:pPr>
-          <a:r>
-            <a:rPr lang="en-US" altLang="zh-CN" sz="1700" kern="1200" dirty="0" smtClean="0"/>
-            <a:t>Event D</a:t>
-          </a:r>
-          <a:r>
-            <a:rPr lang="zh-CN" sz="1700" b="0" kern="1200" dirty="0" smtClean="0"/>
-            <a:t>riven</a:t>
-          </a:r>
-          <a:endParaRPr lang="zh-CN" altLang="en-US" sz="1700" kern="1200" dirty="0"/>
-        </a:p>
-        <a:p>
-          <a:pPr marL="171450" lvl="1" indent="-171450" algn="l" defTabSz="755650">
-            <a:lnSpc>
-              <a:spcPct val="90000"/>
-            </a:lnSpc>
-            <a:spcBef>
-              <a:spcPct val="0"/>
-            </a:spcBef>
-            <a:spcAft>
-              <a:spcPct val="15000"/>
-            </a:spcAft>
-            <a:buChar char="••"/>
-          </a:pPr>
-          <a:r>
-            <a:rPr lang="zh-CN" altLang="en-US" sz="1700" kern="1200" dirty="0" smtClean="0"/>
-            <a:t>消息队列</a:t>
-          </a:r>
-          <a:endParaRPr lang="zh-CN" altLang="en-US" sz="1700" kern="1200" dirty="0"/>
-        </a:p>
-        <a:p>
-          <a:pPr marL="171450" lvl="1" indent="-171450" algn="l" defTabSz="755650">
-            <a:lnSpc>
-              <a:spcPct val="90000"/>
-            </a:lnSpc>
-            <a:spcBef>
-              <a:spcPct val="0"/>
-            </a:spcBef>
-            <a:spcAft>
-              <a:spcPct val="15000"/>
-            </a:spcAft>
-            <a:buChar char="••"/>
-          </a:pPr>
-          <a:r>
-            <a:rPr lang="zh-CN" altLang="en-US" sz="1700" kern="1200" dirty="0" smtClean="0"/>
-            <a:t>设计模式</a:t>
-          </a:r>
-          <a:endParaRPr lang="zh-CN" altLang="en-US" sz="1700" kern="1200" dirty="0"/>
-        </a:p>
-        <a:p>
-          <a:pPr marL="171450" lvl="1" indent="-171450" algn="l" defTabSz="755650">
-            <a:lnSpc>
-              <a:spcPct val="90000"/>
-            </a:lnSpc>
-            <a:spcBef>
-              <a:spcPct val="0"/>
-            </a:spcBef>
-            <a:spcAft>
-              <a:spcPct val="15000"/>
-            </a:spcAft>
-            <a:buChar char="••"/>
-          </a:pPr>
-          <a:r>
-            <a:rPr lang="en-US" altLang="zh-CN" sz="1700" kern="1200" dirty="0" err="1" smtClean="0"/>
-            <a:t>CloudStack</a:t>
-          </a:r>
-          <a:endParaRPr lang="zh-CN" altLang="en-US" sz="1700" kern="1200" dirty="0"/>
-        </a:p>
-        <a:p>
-          <a:pPr marL="171450" lvl="1" indent="-171450" algn="l" defTabSz="755650">
-            <a:lnSpc>
-              <a:spcPct val="90000"/>
-            </a:lnSpc>
-            <a:spcBef>
-              <a:spcPct val="0"/>
-            </a:spcBef>
-            <a:spcAft>
-              <a:spcPct val="15000"/>
-            </a:spcAft>
-            <a:buChar char="••"/>
-          </a:pPr>
-          <a:r>
-            <a:rPr lang="en-US" altLang="zh-CN" sz="1700" kern="1200" dirty="0" err="1" smtClean="0"/>
-            <a:t>Git</a:t>
-          </a:r>
-          <a:endParaRPr lang="zh-CN" altLang="en-US" sz="1700" kern="1200" dirty="0"/>
-        </a:p>
-        <a:p>
-          <a:pPr marL="171450" lvl="1" indent="-171450" algn="l" defTabSz="755650">
-            <a:lnSpc>
-              <a:spcPct val="90000"/>
-            </a:lnSpc>
-            <a:spcBef>
-              <a:spcPct val="0"/>
-            </a:spcBef>
-            <a:spcAft>
-              <a:spcPct val="15000"/>
-            </a:spcAft>
-            <a:buChar char="••"/>
-          </a:pPr>
-          <a:r>
-            <a:rPr lang="en-US" altLang="zh-CN" sz="1700" kern="1200" dirty="0" smtClean="0"/>
-            <a:t>CI</a:t>
-          </a:r>
-          <a:endParaRPr lang="zh-CN" altLang="en-US" sz="1700" kern="1200" dirty="0"/>
-        </a:p>
-        <a:p>
-          <a:pPr marL="171450" lvl="1" indent="-171450" algn="l" defTabSz="755650">
-            <a:lnSpc>
-              <a:spcPct val="90000"/>
-            </a:lnSpc>
-            <a:spcBef>
-              <a:spcPct val="0"/>
-            </a:spcBef>
-            <a:spcAft>
-              <a:spcPct val="15000"/>
-            </a:spcAft>
-            <a:buChar char="••"/>
-          </a:pPr>
-          <a:endParaRPr lang="zh-CN" altLang="en-US" sz="1700" kern="1200" dirty="0"/>
-        </a:p>
-      </dsp:txBody>
-      <dsp:txXfrm rot="5400000">
-        <a:off x="5616662" y="905192"/>
-        <a:ext cx="2611933" cy="2715577"/>
-      </dsp:txXfrm>
-    </dsp:sp>
   </dsp:spTree>
 </dsp:drawing>
 </file>
@@ -3952,7 +3302,7 @@
           <a:p>
             <a:fld id="{20691C44-5AA0-4D87-9EF9-F757AE918975}" type="datetimeFigureOut">
               <a:rPr lang="zh-CN" altLang="en-US" smtClean="0"/>
-              <a:t>2013/11/19</a:t>
+              <a:t>2013/11/20</a:t>
             </a:fld>
             <a:endParaRPr lang="zh-CN" altLang="en-US"/>
           </a:p>
@@ -4264,6 +3614,2610 @@
           <a:bodyPr/>
           <a:lstStyle/>
           <a:p>
+            <a:endParaRPr lang="zh-CN" altLang="en-US"/>
+          </a:p>
+        </p:txBody>
+      </p:sp>
+      <p:sp>
+        <p:nvSpPr>
+          <p:cNvPr id="4" name="灯片编号占位符 3"/>
+          <p:cNvSpPr>
+            <a:spLocks noGrp="1"/>
+          </p:cNvSpPr>
+          <p:nvPr>
+            <p:ph type="sldNum" sz="quarter" idx="10"/>
+          </p:nvPr>
+        </p:nvSpPr>
+        <p:spPr/>
+        <p:txBody>
+          <a:bodyPr/>
+          <a:lstStyle/>
+          <a:p>
+            <a:fld id="{26F4831F-6F0E-43EF-BED8-BEEBB84EC01E}" type="slidenum">
+              <a:rPr lang="zh-CN" altLang="en-US" smtClean="0"/>
+              <a:t>1</a:t>
+            </a:fld>
+            <a:endParaRPr lang="zh-CN" altLang="en-US"/>
+          </a:p>
+        </p:txBody>
+      </p:sp>
+    </p:spTree>
+    <p:extLst>
+      <p:ext uri="{BB962C8B-B14F-4D97-AF65-F5344CB8AC3E}">
+        <p14:creationId xmlns:p14="http://schemas.microsoft.com/office/powerpoint/2010/main" val="1499001777"/>
+      </p:ext>
+    </p:extLst>
+  </p:cSld>
+  <p:clrMapOvr>
+    <a:masterClrMapping/>
+  </p:clrMapOvr>
+</p:notes>
+</file>
+
+<file path=ppt/notesSlides/notesSlide10.xml><?xml version="1.0" encoding="utf-8"?>
+<p:notes xmlns:a="http://schemas.openxmlformats.org/drawingml/2006/main" xmlns:r="http://schemas.openxmlformats.org/officeDocument/2006/relationships" xmlns:p="http://schemas.openxmlformats.org/presentationml/2006/main">
+  <p:cSld>
+    <p:spTree>
+      <p:nvGrpSpPr>
+        <p:cNvPr id="1" name=""/>
+        <p:cNvGrpSpPr/>
+        <p:nvPr/>
+      </p:nvGrpSpPr>
+      <p:grpSpPr>
+        <a:xfrm>
+          <a:off x="0" y="0"/>
+          <a:ext cx="0" cy="0"/>
+          <a:chOff x="0" y="0"/>
+          <a:chExt cx="0" cy="0"/>
+        </a:xfrm>
+      </p:grpSpPr>
+      <p:sp>
+        <p:nvSpPr>
+          <p:cNvPr id="2" name="幻灯片图像占位符 1"/>
+          <p:cNvSpPr>
+            <a:spLocks noGrp="1" noRot="1" noChangeAspect="1"/>
+          </p:cNvSpPr>
+          <p:nvPr>
+            <p:ph type="sldImg"/>
+          </p:nvPr>
+        </p:nvSpPr>
+        <p:spPr/>
+      </p:sp>
+      <p:sp>
+        <p:nvSpPr>
+          <p:cNvPr id="3" name="备注占位符 2"/>
+          <p:cNvSpPr>
+            <a:spLocks noGrp="1"/>
+          </p:cNvSpPr>
+          <p:nvPr>
+            <p:ph type="body" idx="1"/>
+          </p:nvPr>
+        </p:nvSpPr>
+        <p:spPr/>
+        <p:txBody>
+          <a:bodyPr/>
+          <a:lstStyle/>
+          <a:p>
+            <a:endParaRPr lang="zh-CN" altLang="en-US"/>
+          </a:p>
+        </p:txBody>
+      </p:sp>
+      <p:sp>
+        <p:nvSpPr>
+          <p:cNvPr id="4" name="灯片编号占位符 3"/>
+          <p:cNvSpPr>
+            <a:spLocks noGrp="1"/>
+          </p:cNvSpPr>
+          <p:nvPr>
+            <p:ph type="sldNum" sz="quarter" idx="10"/>
+          </p:nvPr>
+        </p:nvSpPr>
+        <p:spPr/>
+        <p:txBody>
+          <a:bodyPr/>
+          <a:lstStyle/>
+          <a:p>
+            <a:fld id="{26F4831F-6F0E-43EF-BED8-BEEBB84EC01E}" type="slidenum">
+              <a:rPr lang="zh-CN" altLang="en-US" smtClean="0"/>
+              <a:t>10</a:t>
+            </a:fld>
+            <a:endParaRPr lang="zh-CN" altLang="en-US"/>
+          </a:p>
+        </p:txBody>
+      </p:sp>
+    </p:spTree>
+    <p:extLst>
+      <p:ext uri="{BB962C8B-B14F-4D97-AF65-F5344CB8AC3E}">
+        <p14:creationId xmlns:p14="http://schemas.microsoft.com/office/powerpoint/2010/main" val="284899293"/>
+      </p:ext>
+    </p:extLst>
+  </p:cSld>
+  <p:clrMapOvr>
+    <a:masterClrMapping/>
+  </p:clrMapOvr>
+</p:notes>
+</file>
+
+<file path=ppt/notesSlides/notesSlide11.xml><?xml version="1.0" encoding="utf-8"?>
+<p:notes xmlns:a="http://schemas.openxmlformats.org/drawingml/2006/main" xmlns:r="http://schemas.openxmlformats.org/officeDocument/2006/relationships" xmlns:p="http://schemas.openxmlformats.org/presentationml/2006/main">
+  <p:cSld>
+    <p:spTree>
+      <p:nvGrpSpPr>
+        <p:cNvPr id="1" name=""/>
+        <p:cNvGrpSpPr/>
+        <p:nvPr/>
+      </p:nvGrpSpPr>
+      <p:grpSpPr>
+        <a:xfrm>
+          <a:off x="0" y="0"/>
+          <a:ext cx="0" cy="0"/>
+          <a:chOff x="0" y="0"/>
+          <a:chExt cx="0" cy="0"/>
+        </a:xfrm>
+      </p:grpSpPr>
+      <p:sp>
+        <p:nvSpPr>
+          <p:cNvPr id="2" name="幻灯片图像占位符 1"/>
+          <p:cNvSpPr>
+            <a:spLocks noGrp="1" noRot="1" noChangeAspect="1"/>
+          </p:cNvSpPr>
+          <p:nvPr>
+            <p:ph type="sldImg"/>
+          </p:nvPr>
+        </p:nvSpPr>
+        <p:spPr/>
+      </p:sp>
+      <p:sp>
+        <p:nvSpPr>
+          <p:cNvPr id="3" name="备注占位符 2"/>
+          <p:cNvSpPr>
+            <a:spLocks noGrp="1"/>
+          </p:cNvSpPr>
+          <p:nvPr>
+            <p:ph type="body" idx="1"/>
+          </p:nvPr>
+        </p:nvSpPr>
+        <p:spPr/>
+        <p:txBody>
+          <a:bodyPr/>
+          <a:lstStyle/>
+          <a:p>
+            <a:endParaRPr lang="zh-CN" altLang="en-US"/>
+          </a:p>
+        </p:txBody>
+      </p:sp>
+      <p:sp>
+        <p:nvSpPr>
+          <p:cNvPr id="4" name="灯片编号占位符 3"/>
+          <p:cNvSpPr>
+            <a:spLocks noGrp="1"/>
+          </p:cNvSpPr>
+          <p:nvPr>
+            <p:ph type="sldNum" sz="quarter" idx="10"/>
+          </p:nvPr>
+        </p:nvSpPr>
+        <p:spPr/>
+        <p:txBody>
+          <a:bodyPr/>
+          <a:lstStyle/>
+          <a:p>
+            <a:fld id="{26F4831F-6F0E-43EF-BED8-BEEBB84EC01E}" type="slidenum">
+              <a:rPr lang="zh-CN" altLang="en-US" smtClean="0"/>
+              <a:t>11</a:t>
+            </a:fld>
+            <a:endParaRPr lang="zh-CN" altLang="en-US"/>
+          </a:p>
+        </p:txBody>
+      </p:sp>
+    </p:spTree>
+    <p:extLst>
+      <p:ext uri="{BB962C8B-B14F-4D97-AF65-F5344CB8AC3E}">
+        <p14:creationId xmlns:p14="http://schemas.microsoft.com/office/powerpoint/2010/main" val="3686778937"/>
+      </p:ext>
+    </p:extLst>
+  </p:cSld>
+  <p:clrMapOvr>
+    <a:masterClrMapping/>
+  </p:clrMapOvr>
+</p:notes>
+</file>
+
+<file path=ppt/notesSlides/notesSlide12.xml><?xml version="1.0" encoding="utf-8"?>
+<p:notes xmlns:a="http://schemas.openxmlformats.org/drawingml/2006/main" xmlns:r="http://schemas.openxmlformats.org/officeDocument/2006/relationships" xmlns:p="http://schemas.openxmlformats.org/presentationml/2006/main">
+  <p:cSld>
+    <p:spTree>
+      <p:nvGrpSpPr>
+        <p:cNvPr id="1" name=""/>
+        <p:cNvGrpSpPr/>
+        <p:nvPr/>
+      </p:nvGrpSpPr>
+      <p:grpSpPr>
+        <a:xfrm>
+          <a:off x="0" y="0"/>
+          <a:ext cx="0" cy="0"/>
+          <a:chOff x="0" y="0"/>
+          <a:chExt cx="0" cy="0"/>
+        </a:xfrm>
+      </p:grpSpPr>
+      <p:sp>
+        <p:nvSpPr>
+          <p:cNvPr id="2" name="幻灯片图像占位符 1"/>
+          <p:cNvSpPr>
+            <a:spLocks noGrp="1" noRot="1" noChangeAspect="1"/>
+          </p:cNvSpPr>
+          <p:nvPr>
+            <p:ph type="sldImg"/>
+          </p:nvPr>
+        </p:nvSpPr>
+        <p:spPr/>
+      </p:sp>
+      <p:sp>
+        <p:nvSpPr>
+          <p:cNvPr id="3" name="备注占位符 2"/>
+          <p:cNvSpPr>
+            <a:spLocks noGrp="1"/>
+          </p:cNvSpPr>
+          <p:nvPr>
+            <p:ph type="body" idx="1"/>
+          </p:nvPr>
+        </p:nvSpPr>
+        <p:spPr/>
+        <p:txBody>
+          <a:bodyPr/>
+          <a:lstStyle/>
+          <a:p>
+            <a:endParaRPr lang="zh-CN" altLang="en-US"/>
+          </a:p>
+        </p:txBody>
+      </p:sp>
+      <p:sp>
+        <p:nvSpPr>
+          <p:cNvPr id="4" name="灯片编号占位符 3"/>
+          <p:cNvSpPr>
+            <a:spLocks noGrp="1"/>
+          </p:cNvSpPr>
+          <p:nvPr>
+            <p:ph type="sldNum" sz="quarter" idx="10"/>
+          </p:nvPr>
+        </p:nvSpPr>
+        <p:spPr/>
+        <p:txBody>
+          <a:bodyPr/>
+          <a:lstStyle/>
+          <a:p>
+            <a:fld id="{26F4831F-6F0E-43EF-BED8-BEEBB84EC01E}" type="slidenum">
+              <a:rPr lang="zh-CN" altLang="en-US" smtClean="0"/>
+              <a:t>12</a:t>
+            </a:fld>
+            <a:endParaRPr lang="zh-CN" altLang="en-US"/>
+          </a:p>
+        </p:txBody>
+      </p:sp>
+    </p:spTree>
+    <p:extLst>
+      <p:ext uri="{BB962C8B-B14F-4D97-AF65-F5344CB8AC3E}">
+        <p14:creationId xmlns:p14="http://schemas.microsoft.com/office/powerpoint/2010/main" val="3928992781"/>
+      </p:ext>
+    </p:extLst>
+  </p:cSld>
+  <p:clrMapOvr>
+    <a:masterClrMapping/>
+  </p:clrMapOvr>
+</p:notes>
+</file>
+
+<file path=ppt/notesSlides/notesSlide13.xml><?xml version="1.0" encoding="utf-8"?>
+<p:notes xmlns:a="http://schemas.openxmlformats.org/drawingml/2006/main" xmlns:r="http://schemas.openxmlformats.org/officeDocument/2006/relationships" xmlns:p="http://schemas.openxmlformats.org/presentationml/2006/main">
+  <p:cSld>
+    <p:spTree>
+      <p:nvGrpSpPr>
+        <p:cNvPr id="1" name=""/>
+        <p:cNvGrpSpPr/>
+        <p:nvPr/>
+      </p:nvGrpSpPr>
+      <p:grpSpPr>
+        <a:xfrm>
+          <a:off x="0" y="0"/>
+          <a:ext cx="0" cy="0"/>
+          <a:chOff x="0" y="0"/>
+          <a:chExt cx="0" cy="0"/>
+        </a:xfrm>
+      </p:grpSpPr>
+      <p:sp>
+        <p:nvSpPr>
+          <p:cNvPr id="2" name="幻灯片图像占位符 1"/>
+          <p:cNvSpPr>
+            <a:spLocks noGrp="1" noRot="1" noChangeAspect="1"/>
+          </p:cNvSpPr>
+          <p:nvPr>
+            <p:ph type="sldImg"/>
+          </p:nvPr>
+        </p:nvSpPr>
+        <p:spPr/>
+      </p:sp>
+      <p:sp>
+        <p:nvSpPr>
+          <p:cNvPr id="3" name="备注占位符 2"/>
+          <p:cNvSpPr>
+            <a:spLocks noGrp="1"/>
+          </p:cNvSpPr>
+          <p:nvPr>
+            <p:ph type="body" idx="1"/>
+          </p:nvPr>
+        </p:nvSpPr>
+        <p:spPr/>
+        <p:txBody>
+          <a:bodyPr/>
+          <a:lstStyle/>
+          <a:p>
+            <a:endParaRPr lang="zh-CN" altLang="en-US"/>
+          </a:p>
+        </p:txBody>
+      </p:sp>
+      <p:sp>
+        <p:nvSpPr>
+          <p:cNvPr id="4" name="灯片编号占位符 3"/>
+          <p:cNvSpPr>
+            <a:spLocks noGrp="1"/>
+          </p:cNvSpPr>
+          <p:nvPr>
+            <p:ph type="sldNum" sz="quarter" idx="10"/>
+          </p:nvPr>
+        </p:nvSpPr>
+        <p:spPr/>
+        <p:txBody>
+          <a:bodyPr/>
+          <a:lstStyle/>
+          <a:p>
+            <a:fld id="{26F4831F-6F0E-43EF-BED8-BEEBB84EC01E}" type="slidenum">
+              <a:rPr lang="zh-CN" altLang="en-US" smtClean="0"/>
+              <a:t>13</a:t>
+            </a:fld>
+            <a:endParaRPr lang="zh-CN" altLang="en-US"/>
+          </a:p>
+        </p:txBody>
+      </p:sp>
+    </p:spTree>
+    <p:extLst>
+      <p:ext uri="{BB962C8B-B14F-4D97-AF65-F5344CB8AC3E}">
+        <p14:creationId xmlns:p14="http://schemas.microsoft.com/office/powerpoint/2010/main" val="227610556"/>
+      </p:ext>
+    </p:extLst>
+  </p:cSld>
+  <p:clrMapOvr>
+    <a:masterClrMapping/>
+  </p:clrMapOvr>
+</p:notes>
+</file>
+
+<file path=ppt/notesSlides/notesSlide14.xml><?xml version="1.0" encoding="utf-8"?>
+<p:notes xmlns:a="http://schemas.openxmlformats.org/drawingml/2006/main" xmlns:r="http://schemas.openxmlformats.org/officeDocument/2006/relationships" xmlns:p="http://schemas.openxmlformats.org/presentationml/2006/main">
+  <p:cSld>
+    <p:spTree>
+      <p:nvGrpSpPr>
+        <p:cNvPr id="1" name=""/>
+        <p:cNvGrpSpPr/>
+        <p:nvPr/>
+      </p:nvGrpSpPr>
+      <p:grpSpPr>
+        <a:xfrm>
+          <a:off x="0" y="0"/>
+          <a:ext cx="0" cy="0"/>
+          <a:chOff x="0" y="0"/>
+          <a:chExt cx="0" cy="0"/>
+        </a:xfrm>
+      </p:grpSpPr>
+      <p:sp>
+        <p:nvSpPr>
+          <p:cNvPr id="2" name="幻灯片图像占位符 1"/>
+          <p:cNvSpPr>
+            <a:spLocks noGrp="1" noRot="1" noChangeAspect="1"/>
+          </p:cNvSpPr>
+          <p:nvPr>
+            <p:ph type="sldImg"/>
+          </p:nvPr>
+        </p:nvSpPr>
+        <p:spPr/>
+      </p:sp>
+      <p:sp>
+        <p:nvSpPr>
+          <p:cNvPr id="3" name="备注占位符 2"/>
+          <p:cNvSpPr>
+            <a:spLocks noGrp="1"/>
+          </p:cNvSpPr>
+          <p:nvPr>
+            <p:ph type="body" idx="1"/>
+          </p:nvPr>
+        </p:nvSpPr>
+        <p:spPr/>
+        <p:txBody>
+          <a:bodyPr/>
+          <a:lstStyle/>
+          <a:p>
+            <a:endParaRPr lang="zh-CN" altLang="en-US"/>
+          </a:p>
+        </p:txBody>
+      </p:sp>
+      <p:sp>
+        <p:nvSpPr>
+          <p:cNvPr id="4" name="灯片编号占位符 3"/>
+          <p:cNvSpPr>
+            <a:spLocks noGrp="1"/>
+          </p:cNvSpPr>
+          <p:nvPr>
+            <p:ph type="sldNum" sz="quarter" idx="10"/>
+          </p:nvPr>
+        </p:nvSpPr>
+        <p:spPr/>
+        <p:txBody>
+          <a:bodyPr/>
+          <a:lstStyle/>
+          <a:p>
+            <a:fld id="{26F4831F-6F0E-43EF-BED8-BEEBB84EC01E}" type="slidenum">
+              <a:rPr lang="zh-CN" altLang="en-US" smtClean="0"/>
+              <a:t>14</a:t>
+            </a:fld>
+            <a:endParaRPr lang="zh-CN" altLang="en-US"/>
+          </a:p>
+        </p:txBody>
+      </p:sp>
+    </p:spTree>
+    <p:extLst>
+      <p:ext uri="{BB962C8B-B14F-4D97-AF65-F5344CB8AC3E}">
+        <p14:creationId xmlns:p14="http://schemas.microsoft.com/office/powerpoint/2010/main" val="1147284011"/>
+      </p:ext>
+    </p:extLst>
+  </p:cSld>
+  <p:clrMapOvr>
+    <a:masterClrMapping/>
+  </p:clrMapOvr>
+</p:notes>
+</file>
+
+<file path=ppt/notesSlides/notesSlide15.xml><?xml version="1.0" encoding="utf-8"?>
+<p:notes xmlns:a="http://schemas.openxmlformats.org/drawingml/2006/main" xmlns:r="http://schemas.openxmlformats.org/officeDocument/2006/relationships" xmlns:p="http://schemas.openxmlformats.org/presentationml/2006/main">
+  <p:cSld>
+    <p:spTree>
+      <p:nvGrpSpPr>
+        <p:cNvPr id="1" name=""/>
+        <p:cNvGrpSpPr/>
+        <p:nvPr/>
+      </p:nvGrpSpPr>
+      <p:grpSpPr>
+        <a:xfrm>
+          <a:off x="0" y="0"/>
+          <a:ext cx="0" cy="0"/>
+          <a:chOff x="0" y="0"/>
+          <a:chExt cx="0" cy="0"/>
+        </a:xfrm>
+      </p:grpSpPr>
+      <p:sp>
+        <p:nvSpPr>
+          <p:cNvPr id="2" name="幻灯片图像占位符 1"/>
+          <p:cNvSpPr>
+            <a:spLocks noGrp="1" noRot="1" noChangeAspect="1"/>
+          </p:cNvSpPr>
+          <p:nvPr>
+            <p:ph type="sldImg"/>
+          </p:nvPr>
+        </p:nvSpPr>
+        <p:spPr/>
+      </p:sp>
+      <p:sp>
+        <p:nvSpPr>
+          <p:cNvPr id="3" name="备注占位符 2"/>
+          <p:cNvSpPr>
+            <a:spLocks noGrp="1"/>
+          </p:cNvSpPr>
+          <p:nvPr>
+            <p:ph type="body" idx="1"/>
+          </p:nvPr>
+        </p:nvSpPr>
+        <p:spPr/>
+        <p:txBody>
+          <a:bodyPr/>
+          <a:lstStyle/>
+          <a:p>
+            <a:endParaRPr lang="zh-CN" altLang="en-US"/>
+          </a:p>
+        </p:txBody>
+      </p:sp>
+      <p:sp>
+        <p:nvSpPr>
+          <p:cNvPr id="4" name="灯片编号占位符 3"/>
+          <p:cNvSpPr>
+            <a:spLocks noGrp="1"/>
+          </p:cNvSpPr>
+          <p:nvPr>
+            <p:ph type="sldNum" sz="quarter" idx="10"/>
+          </p:nvPr>
+        </p:nvSpPr>
+        <p:spPr/>
+        <p:txBody>
+          <a:bodyPr/>
+          <a:lstStyle/>
+          <a:p>
+            <a:fld id="{26F4831F-6F0E-43EF-BED8-BEEBB84EC01E}" type="slidenum">
+              <a:rPr lang="zh-CN" altLang="en-US" smtClean="0"/>
+              <a:t>15</a:t>
+            </a:fld>
+            <a:endParaRPr lang="zh-CN" altLang="en-US"/>
+          </a:p>
+        </p:txBody>
+      </p:sp>
+    </p:spTree>
+    <p:extLst>
+      <p:ext uri="{BB962C8B-B14F-4D97-AF65-F5344CB8AC3E}">
+        <p14:creationId xmlns:p14="http://schemas.microsoft.com/office/powerpoint/2010/main" val="3420166040"/>
+      </p:ext>
+    </p:extLst>
+  </p:cSld>
+  <p:clrMapOvr>
+    <a:masterClrMapping/>
+  </p:clrMapOvr>
+</p:notes>
+</file>
+
+<file path=ppt/notesSlides/notesSlide16.xml><?xml version="1.0" encoding="utf-8"?>
+<p:notes xmlns:a="http://schemas.openxmlformats.org/drawingml/2006/main" xmlns:r="http://schemas.openxmlformats.org/officeDocument/2006/relationships" xmlns:p="http://schemas.openxmlformats.org/presentationml/2006/main">
+  <p:cSld>
+    <p:spTree>
+      <p:nvGrpSpPr>
+        <p:cNvPr id="1" name=""/>
+        <p:cNvGrpSpPr/>
+        <p:nvPr/>
+      </p:nvGrpSpPr>
+      <p:grpSpPr>
+        <a:xfrm>
+          <a:off x="0" y="0"/>
+          <a:ext cx="0" cy="0"/>
+          <a:chOff x="0" y="0"/>
+          <a:chExt cx="0" cy="0"/>
+        </a:xfrm>
+      </p:grpSpPr>
+      <p:sp>
+        <p:nvSpPr>
+          <p:cNvPr id="2" name="幻灯片图像占位符 1"/>
+          <p:cNvSpPr>
+            <a:spLocks noGrp="1" noRot="1" noChangeAspect="1"/>
+          </p:cNvSpPr>
+          <p:nvPr>
+            <p:ph type="sldImg"/>
+          </p:nvPr>
+        </p:nvSpPr>
+        <p:spPr/>
+      </p:sp>
+      <p:sp>
+        <p:nvSpPr>
+          <p:cNvPr id="3" name="备注占位符 2"/>
+          <p:cNvSpPr>
+            <a:spLocks noGrp="1"/>
+          </p:cNvSpPr>
+          <p:nvPr>
+            <p:ph type="body" idx="1"/>
+          </p:nvPr>
+        </p:nvSpPr>
+        <p:spPr/>
+        <p:txBody>
+          <a:bodyPr/>
+          <a:lstStyle/>
+          <a:p>
+            <a:endParaRPr lang="zh-CN" altLang="en-US"/>
+          </a:p>
+        </p:txBody>
+      </p:sp>
+      <p:sp>
+        <p:nvSpPr>
+          <p:cNvPr id="4" name="灯片编号占位符 3"/>
+          <p:cNvSpPr>
+            <a:spLocks noGrp="1"/>
+          </p:cNvSpPr>
+          <p:nvPr>
+            <p:ph type="sldNum" sz="quarter" idx="10"/>
+          </p:nvPr>
+        </p:nvSpPr>
+        <p:spPr/>
+        <p:txBody>
+          <a:bodyPr/>
+          <a:lstStyle/>
+          <a:p>
+            <a:fld id="{26F4831F-6F0E-43EF-BED8-BEEBB84EC01E}" type="slidenum">
+              <a:rPr lang="zh-CN" altLang="en-US" smtClean="0"/>
+              <a:t>16</a:t>
+            </a:fld>
+            <a:endParaRPr lang="zh-CN" altLang="en-US"/>
+          </a:p>
+        </p:txBody>
+      </p:sp>
+    </p:spTree>
+    <p:extLst>
+      <p:ext uri="{BB962C8B-B14F-4D97-AF65-F5344CB8AC3E}">
+        <p14:creationId xmlns:p14="http://schemas.microsoft.com/office/powerpoint/2010/main" val="3791614527"/>
+      </p:ext>
+    </p:extLst>
+  </p:cSld>
+  <p:clrMapOvr>
+    <a:masterClrMapping/>
+  </p:clrMapOvr>
+</p:notes>
+</file>
+
+<file path=ppt/notesSlides/notesSlide17.xml><?xml version="1.0" encoding="utf-8"?>
+<p:notes xmlns:a="http://schemas.openxmlformats.org/drawingml/2006/main" xmlns:r="http://schemas.openxmlformats.org/officeDocument/2006/relationships" xmlns:p="http://schemas.openxmlformats.org/presentationml/2006/main">
+  <p:cSld>
+    <p:spTree>
+      <p:nvGrpSpPr>
+        <p:cNvPr id="1" name=""/>
+        <p:cNvGrpSpPr/>
+        <p:nvPr/>
+      </p:nvGrpSpPr>
+      <p:grpSpPr>
+        <a:xfrm>
+          <a:off x="0" y="0"/>
+          <a:ext cx="0" cy="0"/>
+          <a:chOff x="0" y="0"/>
+          <a:chExt cx="0" cy="0"/>
+        </a:xfrm>
+      </p:grpSpPr>
+      <p:sp>
+        <p:nvSpPr>
+          <p:cNvPr id="2" name="幻灯片图像占位符 1"/>
+          <p:cNvSpPr>
+            <a:spLocks noGrp="1" noRot="1" noChangeAspect="1"/>
+          </p:cNvSpPr>
+          <p:nvPr>
+            <p:ph type="sldImg"/>
+          </p:nvPr>
+        </p:nvSpPr>
+        <p:spPr/>
+      </p:sp>
+      <p:sp>
+        <p:nvSpPr>
+          <p:cNvPr id="3" name="备注占位符 2"/>
+          <p:cNvSpPr>
+            <a:spLocks noGrp="1"/>
+          </p:cNvSpPr>
+          <p:nvPr>
+            <p:ph type="body" idx="1"/>
+          </p:nvPr>
+        </p:nvSpPr>
+        <p:spPr/>
+        <p:txBody>
+          <a:bodyPr/>
+          <a:lstStyle/>
+          <a:p>
+            <a:endParaRPr lang="zh-CN" altLang="en-US"/>
+          </a:p>
+        </p:txBody>
+      </p:sp>
+      <p:sp>
+        <p:nvSpPr>
+          <p:cNvPr id="4" name="灯片编号占位符 3"/>
+          <p:cNvSpPr>
+            <a:spLocks noGrp="1"/>
+          </p:cNvSpPr>
+          <p:nvPr>
+            <p:ph type="sldNum" sz="quarter" idx="10"/>
+          </p:nvPr>
+        </p:nvSpPr>
+        <p:spPr/>
+        <p:txBody>
+          <a:bodyPr/>
+          <a:lstStyle/>
+          <a:p>
+            <a:fld id="{26F4831F-6F0E-43EF-BED8-BEEBB84EC01E}" type="slidenum">
+              <a:rPr lang="zh-CN" altLang="en-US" smtClean="0"/>
+              <a:t>17</a:t>
+            </a:fld>
+            <a:endParaRPr lang="zh-CN" altLang="en-US"/>
+          </a:p>
+        </p:txBody>
+      </p:sp>
+    </p:spTree>
+    <p:extLst>
+      <p:ext uri="{BB962C8B-B14F-4D97-AF65-F5344CB8AC3E}">
+        <p14:creationId xmlns:p14="http://schemas.microsoft.com/office/powerpoint/2010/main" val="1720871181"/>
+      </p:ext>
+    </p:extLst>
+  </p:cSld>
+  <p:clrMapOvr>
+    <a:masterClrMapping/>
+  </p:clrMapOvr>
+</p:notes>
+</file>
+
+<file path=ppt/notesSlides/notesSlide18.xml><?xml version="1.0" encoding="utf-8"?>
+<p:notes xmlns:a="http://schemas.openxmlformats.org/drawingml/2006/main" xmlns:r="http://schemas.openxmlformats.org/officeDocument/2006/relationships" xmlns:p="http://schemas.openxmlformats.org/presentationml/2006/main">
+  <p:cSld>
+    <p:spTree>
+      <p:nvGrpSpPr>
+        <p:cNvPr id="1" name=""/>
+        <p:cNvGrpSpPr/>
+        <p:nvPr/>
+      </p:nvGrpSpPr>
+      <p:grpSpPr>
+        <a:xfrm>
+          <a:off x="0" y="0"/>
+          <a:ext cx="0" cy="0"/>
+          <a:chOff x="0" y="0"/>
+          <a:chExt cx="0" cy="0"/>
+        </a:xfrm>
+      </p:grpSpPr>
+      <p:sp>
+        <p:nvSpPr>
+          <p:cNvPr id="2" name="幻灯片图像占位符 1"/>
+          <p:cNvSpPr>
+            <a:spLocks noGrp="1" noRot="1" noChangeAspect="1"/>
+          </p:cNvSpPr>
+          <p:nvPr>
+            <p:ph type="sldImg"/>
+          </p:nvPr>
+        </p:nvSpPr>
+        <p:spPr/>
+      </p:sp>
+      <p:sp>
+        <p:nvSpPr>
+          <p:cNvPr id="3" name="备注占位符 2"/>
+          <p:cNvSpPr>
+            <a:spLocks noGrp="1"/>
+          </p:cNvSpPr>
+          <p:nvPr>
+            <p:ph type="body" idx="1"/>
+          </p:nvPr>
+        </p:nvSpPr>
+        <p:spPr/>
+        <p:txBody>
+          <a:bodyPr/>
+          <a:lstStyle/>
+          <a:p>
+            <a:endParaRPr lang="zh-CN" altLang="en-US"/>
+          </a:p>
+        </p:txBody>
+      </p:sp>
+      <p:sp>
+        <p:nvSpPr>
+          <p:cNvPr id="4" name="灯片编号占位符 3"/>
+          <p:cNvSpPr>
+            <a:spLocks noGrp="1"/>
+          </p:cNvSpPr>
+          <p:nvPr>
+            <p:ph type="sldNum" sz="quarter" idx="10"/>
+          </p:nvPr>
+        </p:nvSpPr>
+        <p:spPr/>
+        <p:txBody>
+          <a:bodyPr/>
+          <a:lstStyle/>
+          <a:p>
+            <a:fld id="{26F4831F-6F0E-43EF-BED8-BEEBB84EC01E}" type="slidenum">
+              <a:rPr lang="zh-CN" altLang="en-US" smtClean="0"/>
+              <a:t>18</a:t>
+            </a:fld>
+            <a:endParaRPr lang="zh-CN" altLang="en-US"/>
+          </a:p>
+        </p:txBody>
+      </p:sp>
+    </p:spTree>
+    <p:extLst>
+      <p:ext uri="{BB962C8B-B14F-4D97-AF65-F5344CB8AC3E}">
+        <p14:creationId xmlns:p14="http://schemas.microsoft.com/office/powerpoint/2010/main" val="1059962664"/>
+      </p:ext>
+    </p:extLst>
+  </p:cSld>
+  <p:clrMapOvr>
+    <a:masterClrMapping/>
+  </p:clrMapOvr>
+</p:notes>
+</file>
+
+<file path=ppt/notesSlides/notesSlide19.xml><?xml version="1.0" encoding="utf-8"?>
+<p:notes xmlns:a="http://schemas.openxmlformats.org/drawingml/2006/main" xmlns:r="http://schemas.openxmlformats.org/officeDocument/2006/relationships" xmlns:p="http://schemas.openxmlformats.org/presentationml/2006/main">
+  <p:cSld>
+    <p:spTree>
+      <p:nvGrpSpPr>
+        <p:cNvPr id="1" name=""/>
+        <p:cNvGrpSpPr/>
+        <p:nvPr/>
+      </p:nvGrpSpPr>
+      <p:grpSpPr>
+        <a:xfrm>
+          <a:off x="0" y="0"/>
+          <a:ext cx="0" cy="0"/>
+          <a:chOff x="0" y="0"/>
+          <a:chExt cx="0" cy="0"/>
+        </a:xfrm>
+      </p:grpSpPr>
+      <p:sp>
+        <p:nvSpPr>
+          <p:cNvPr id="2" name="幻灯片图像占位符 1"/>
+          <p:cNvSpPr>
+            <a:spLocks noGrp="1" noRot="1" noChangeAspect="1"/>
+          </p:cNvSpPr>
+          <p:nvPr>
+            <p:ph type="sldImg"/>
+          </p:nvPr>
+        </p:nvSpPr>
+        <p:spPr/>
+      </p:sp>
+      <p:sp>
+        <p:nvSpPr>
+          <p:cNvPr id="3" name="备注占位符 2"/>
+          <p:cNvSpPr>
+            <a:spLocks noGrp="1"/>
+          </p:cNvSpPr>
+          <p:nvPr>
+            <p:ph type="body" idx="1"/>
+          </p:nvPr>
+        </p:nvSpPr>
+        <p:spPr/>
+        <p:txBody>
+          <a:bodyPr/>
+          <a:lstStyle/>
+          <a:p>
+            <a:endParaRPr lang="zh-CN" altLang="en-US"/>
+          </a:p>
+        </p:txBody>
+      </p:sp>
+      <p:sp>
+        <p:nvSpPr>
+          <p:cNvPr id="4" name="灯片编号占位符 3"/>
+          <p:cNvSpPr>
+            <a:spLocks noGrp="1"/>
+          </p:cNvSpPr>
+          <p:nvPr>
+            <p:ph type="sldNum" sz="quarter" idx="10"/>
+          </p:nvPr>
+        </p:nvSpPr>
+        <p:spPr/>
+        <p:txBody>
+          <a:bodyPr/>
+          <a:lstStyle/>
+          <a:p>
+            <a:fld id="{26F4831F-6F0E-43EF-BED8-BEEBB84EC01E}" type="slidenum">
+              <a:rPr lang="zh-CN" altLang="en-US" smtClean="0"/>
+              <a:t>19</a:t>
+            </a:fld>
+            <a:endParaRPr lang="zh-CN" altLang="en-US"/>
+          </a:p>
+        </p:txBody>
+      </p:sp>
+    </p:spTree>
+    <p:extLst>
+      <p:ext uri="{BB962C8B-B14F-4D97-AF65-F5344CB8AC3E}">
+        <p14:creationId xmlns:p14="http://schemas.microsoft.com/office/powerpoint/2010/main" val="445478457"/>
+      </p:ext>
+    </p:extLst>
+  </p:cSld>
+  <p:clrMapOvr>
+    <a:masterClrMapping/>
+  </p:clrMapOvr>
+</p:notes>
+</file>
+
+<file path=ppt/notesSlides/notesSlide2.xml><?xml version="1.0" encoding="utf-8"?>
+<p:notes xmlns:a="http://schemas.openxmlformats.org/drawingml/2006/main" xmlns:r="http://schemas.openxmlformats.org/officeDocument/2006/relationships" xmlns:p="http://schemas.openxmlformats.org/presentationml/2006/main">
+  <p:cSld>
+    <p:spTree>
+      <p:nvGrpSpPr>
+        <p:cNvPr id="1" name=""/>
+        <p:cNvGrpSpPr/>
+        <p:nvPr/>
+      </p:nvGrpSpPr>
+      <p:grpSpPr>
+        <a:xfrm>
+          <a:off x="0" y="0"/>
+          <a:ext cx="0" cy="0"/>
+          <a:chOff x="0" y="0"/>
+          <a:chExt cx="0" cy="0"/>
+        </a:xfrm>
+      </p:grpSpPr>
+      <p:sp>
+        <p:nvSpPr>
+          <p:cNvPr id="2" name="幻灯片图像占位符 1"/>
+          <p:cNvSpPr>
+            <a:spLocks noGrp="1" noRot="1" noChangeAspect="1"/>
+          </p:cNvSpPr>
+          <p:nvPr>
+            <p:ph type="sldImg"/>
+          </p:nvPr>
+        </p:nvSpPr>
+        <p:spPr/>
+      </p:sp>
+      <p:sp>
+        <p:nvSpPr>
+          <p:cNvPr id="3" name="备注占位符 2"/>
+          <p:cNvSpPr>
+            <a:spLocks noGrp="1"/>
+          </p:cNvSpPr>
+          <p:nvPr>
+            <p:ph type="body" idx="1"/>
+          </p:nvPr>
+        </p:nvSpPr>
+        <p:spPr/>
+        <p:txBody>
+          <a:bodyPr/>
+          <a:lstStyle/>
+          <a:p>
+            <a:endParaRPr lang="zh-CN" altLang="en-US"/>
+          </a:p>
+        </p:txBody>
+      </p:sp>
+      <p:sp>
+        <p:nvSpPr>
+          <p:cNvPr id="4" name="灯片编号占位符 3"/>
+          <p:cNvSpPr>
+            <a:spLocks noGrp="1"/>
+          </p:cNvSpPr>
+          <p:nvPr>
+            <p:ph type="sldNum" sz="quarter" idx="10"/>
+          </p:nvPr>
+        </p:nvSpPr>
+        <p:spPr/>
+        <p:txBody>
+          <a:bodyPr/>
+          <a:lstStyle/>
+          <a:p>
+            <a:fld id="{26F4831F-6F0E-43EF-BED8-BEEBB84EC01E}" type="slidenum">
+              <a:rPr lang="zh-CN" altLang="en-US" smtClean="0"/>
+              <a:t>2</a:t>
+            </a:fld>
+            <a:endParaRPr lang="zh-CN" altLang="en-US"/>
+          </a:p>
+        </p:txBody>
+      </p:sp>
+    </p:spTree>
+    <p:extLst>
+      <p:ext uri="{BB962C8B-B14F-4D97-AF65-F5344CB8AC3E}">
+        <p14:creationId xmlns:p14="http://schemas.microsoft.com/office/powerpoint/2010/main" val="2577760875"/>
+      </p:ext>
+    </p:extLst>
+  </p:cSld>
+  <p:clrMapOvr>
+    <a:masterClrMapping/>
+  </p:clrMapOvr>
+</p:notes>
+</file>
+
+<file path=ppt/notesSlides/notesSlide20.xml><?xml version="1.0" encoding="utf-8"?>
+<p:notes xmlns:a="http://schemas.openxmlformats.org/drawingml/2006/main" xmlns:r="http://schemas.openxmlformats.org/officeDocument/2006/relationships" xmlns:p="http://schemas.openxmlformats.org/presentationml/2006/main">
+  <p:cSld>
+    <p:spTree>
+      <p:nvGrpSpPr>
+        <p:cNvPr id="1" name=""/>
+        <p:cNvGrpSpPr/>
+        <p:nvPr/>
+      </p:nvGrpSpPr>
+      <p:grpSpPr>
+        <a:xfrm>
+          <a:off x="0" y="0"/>
+          <a:ext cx="0" cy="0"/>
+          <a:chOff x="0" y="0"/>
+          <a:chExt cx="0" cy="0"/>
+        </a:xfrm>
+      </p:grpSpPr>
+      <p:sp>
+        <p:nvSpPr>
+          <p:cNvPr id="2" name="幻灯片图像占位符 1"/>
+          <p:cNvSpPr>
+            <a:spLocks noGrp="1" noRot="1" noChangeAspect="1"/>
+          </p:cNvSpPr>
+          <p:nvPr>
+            <p:ph type="sldImg"/>
+          </p:nvPr>
+        </p:nvSpPr>
+        <p:spPr/>
+      </p:sp>
+      <p:sp>
+        <p:nvSpPr>
+          <p:cNvPr id="3" name="备注占位符 2"/>
+          <p:cNvSpPr>
+            <a:spLocks noGrp="1"/>
+          </p:cNvSpPr>
+          <p:nvPr>
+            <p:ph type="body" idx="1"/>
+          </p:nvPr>
+        </p:nvSpPr>
+        <p:spPr/>
+        <p:txBody>
+          <a:bodyPr/>
+          <a:lstStyle/>
+          <a:p>
+            <a:endParaRPr lang="zh-CN" altLang="en-US"/>
+          </a:p>
+        </p:txBody>
+      </p:sp>
+      <p:sp>
+        <p:nvSpPr>
+          <p:cNvPr id="4" name="灯片编号占位符 3"/>
+          <p:cNvSpPr>
+            <a:spLocks noGrp="1"/>
+          </p:cNvSpPr>
+          <p:nvPr>
+            <p:ph type="sldNum" sz="quarter" idx="10"/>
+          </p:nvPr>
+        </p:nvSpPr>
+        <p:spPr/>
+        <p:txBody>
+          <a:bodyPr/>
+          <a:lstStyle/>
+          <a:p>
+            <a:fld id="{26F4831F-6F0E-43EF-BED8-BEEBB84EC01E}" type="slidenum">
+              <a:rPr lang="zh-CN" altLang="en-US" smtClean="0"/>
+              <a:t>20</a:t>
+            </a:fld>
+            <a:endParaRPr lang="zh-CN" altLang="en-US"/>
+          </a:p>
+        </p:txBody>
+      </p:sp>
+    </p:spTree>
+    <p:extLst>
+      <p:ext uri="{BB962C8B-B14F-4D97-AF65-F5344CB8AC3E}">
+        <p14:creationId xmlns:p14="http://schemas.microsoft.com/office/powerpoint/2010/main" val="2784462405"/>
+      </p:ext>
+    </p:extLst>
+  </p:cSld>
+  <p:clrMapOvr>
+    <a:masterClrMapping/>
+  </p:clrMapOvr>
+</p:notes>
+</file>
+
+<file path=ppt/notesSlides/notesSlide21.xml><?xml version="1.0" encoding="utf-8"?>
+<p:notes xmlns:a="http://schemas.openxmlformats.org/drawingml/2006/main" xmlns:r="http://schemas.openxmlformats.org/officeDocument/2006/relationships" xmlns:p="http://schemas.openxmlformats.org/presentationml/2006/main">
+  <p:cSld>
+    <p:spTree>
+      <p:nvGrpSpPr>
+        <p:cNvPr id="1" name=""/>
+        <p:cNvGrpSpPr/>
+        <p:nvPr/>
+      </p:nvGrpSpPr>
+      <p:grpSpPr>
+        <a:xfrm>
+          <a:off x="0" y="0"/>
+          <a:ext cx="0" cy="0"/>
+          <a:chOff x="0" y="0"/>
+          <a:chExt cx="0" cy="0"/>
+        </a:xfrm>
+      </p:grpSpPr>
+      <p:sp>
+        <p:nvSpPr>
+          <p:cNvPr id="2" name="幻灯片图像占位符 1"/>
+          <p:cNvSpPr>
+            <a:spLocks noGrp="1" noRot="1" noChangeAspect="1"/>
+          </p:cNvSpPr>
+          <p:nvPr>
+            <p:ph type="sldImg"/>
+          </p:nvPr>
+        </p:nvSpPr>
+        <p:spPr/>
+      </p:sp>
+      <p:sp>
+        <p:nvSpPr>
+          <p:cNvPr id="3" name="备注占位符 2"/>
+          <p:cNvSpPr>
+            <a:spLocks noGrp="1"/>
+          </p:cNvSpPr>
+          <p:nvPr>
+            <p:ph type="body" idx="1"/>
+          </p:nvPr>
+        </p:nvSpPr>
+        <p:spPr/>
+        <p:txBody>
+          <a:bodyPr/>
+          <a:lstStyle/>
+          <a:p>
+            <a:endParaRPr lang="zh-CN" altLang="en-US"/>
+          </a:p>
+        </p:txBody>
+      </p:sp>
+      <p:sp>
+        <p:nvSpPr>
+          <p:cNvPr id="4" name="灯片编号占位符 3"/>
+          <p:cNvSpPr>
+            <a:spLocks noGrp="1"/>
+          </p:cNvSpPr>
+          <p:nvPr>
+            <p:ph type="sldNum" sz="quarter" idx="10"/>
+          </p:nvPr>
+        </p:nvSpPr>
+        <p:spPr/>
+        <p:txBody>
+          <a:bodyPr/>
+          <a:lstStyle/>
+          <a:p>
+            <a:fld id="{26F4831F-6F0E-43EF-BED8-BEEBB84EC01E}" type="slidenum">
+              <a:rPr lang="zh-CN" altLang="en-US" smtClean="0"/>
+              <a:t>21</a:t>
+            </a:fld>
+            <a:endParaRPr lang="zh-CN" altLang="en-US"/>
+          </a:p>
+        </p:txBody>
+      </p:sp>
+    </p:spTree>
+    <p:extLst>
+      <p:ext uri="{BB962C8B-B14F-4D97-AF65-F5344CB8AC3E}">
+        <p14:creationId xmlns:p14="http://schemas.microsoft.com/office/powerpoint/2010/main" val="2835655545"/>
+      </p:ext>
+    </p:extLst>
+  </p:cSld>
+  <p:clrMapOvr>
+    <a:masterClrMapping/>
+  </p:clrMapOvr>
+</p:notes>
+</file>
+
+<file path=ppt/notesSlides/notesSlide22.xml><?xml version="1.0" encoding="utf-8"?>
+<p:notes xmlns:a="http://schemas.openxmlformats.org/drawingml/2006/main" xmlns:r="http://schemas.openxmlformats.org/officeDocument/2006/relationships" xmlns:p="http://schemas.openxmlformats.org/presentationml/2006/main">
+  <p:cSld>
+    <p:spTree>
+      <p:nvGrpSpPr>
+        <p:cNvPr id="1" name=""/>
+        <p:cNvGrpSpPr/>
+        <p:nvPr/>
+      </p:nvGrpSpPr>
+      <p:grpSpPr>
+        <a:xfrm>
+          <a:off x="0" y="0"/>
+          <a:ext cx="0" cy="0"/>
+          <a:chOff x="0" y="0"/>
+          <a:chExt cx="0" cy="0"/>
+        </a:xfrm>
+      </p:grpSpPr>
+      <p:sp>
+        <p:nvSpPr>
+          <p:cNvPr id="2" name="幻灯片图像占位符 1"/>
+          <p:cNvSpPr>
+            <a:spLocks noGrp="1" noRot="1" noChangeAspect="1"/>
+          </p:cNvSpPr>
+          <p:nvPr>
+            <p:ph type="sldImg"/>
+          </p:nvPr>
+        </p:nvSpPr>
+        <p:spPr/>
+      </p:sp>
+      <p:sp>
+        <p:nvSpPr>
+          <p:cNvPr id="3" name="备注占位符 2"/>
+          <p:cNvSpPr>
+            <a:spLocks noGrp="1"/>
+          </p:cNvSpPr>
+          <p:nvPr>
+            <p:ph type="body" idx="1"/>
+          </p:nvPr>
+        </p:nvSpPr>
+        <p:spPr/>
+        <p:txBody>
+          <a:bodyPr/>
+          <a:lstStyle/>
+          <a:p>
+            <a:endParaRPr lang="zh-CN" altLang="en-US"/>
+          </a:p>
+        </p:txBody>
+      </p:sp>
+      <p:sp>
+        <p:nvSpPr>
+          <p:cNvPr id="4" name="灯片编号占位符 3"/>
+          <p:cNvSpPr>
+            <a:spLocks noGrp="1"/>
+          </p:cNvSpPr>
+          <p:nvPr>
+            <p:ph type="sldNum" sz="quarter" idx="10"/>
+          </p:nvPr>
+        </p:nvSpPr>
+        <p:spPr/>
+        <p:txBody>
+          <a:bodyPr/>
+          <a:lstStyle/>
+          <a:p>
+            <a:fld id="{26F4831F-6F0E-43EF-BED8-BEEBB84EC01E}" type="slidenum">
+              <a:rPr lang="zh-CN" altLang="en-US" smtClean="0"/>
+              <a:t>22</a:t>
+            </a:fld>
+            <a:endParaRPr lang="zh-CN" altLang="en-US"/>
+          </a:p>
+        </p:txBody>
+      </p:sp>
+    </p:spTree>
+    <p:extLst>
+      <p:ext uri="{BB962C8B-B14F-4D97-AF65-F5344CB8AC3E}">
+        <p14:creationId xmlns:p14="http://schemas.microsoft.com/office/powerpoint/2010/main" val="1986808472"/>
+      </p:ext>
+    </p:extLst>
+  </p:cSld>
+  <p:clrMapOvr>
+    <a:masterClrMapping/>
+  </p:clrMapOvr>
+</p:notes>
+</file>
+
+<file path=ppt/notesSlides/notesSlide23.xml><?xml version="1.0" encoding="utf-8"?>
+<p:notes xmlns:a="http://schemas.openxmlformats.org/drawingml/2006/main" xmlns:r="http://schemas.openxmlformats.org/officeDocument/2006/relationships" xmlns:p="http://schemas.openxmlformats.org/presentationml/2006/main">
+  <p:cSld>
+    <p:spTree>
+      <p:nvGrpSpPr>
+        <p:cNvPr id="1" name=""/>
+        <p:cNvGrpSpPr/>
+        <p:nvPr/>
+      </p:nvGrpSpPr>
+      <p:grpSpPr>
+        <a:xfrm>
+          <a:off x="0" y="0"/>
+          <a:ext cx="0" cy="0"/>
+          <a:chOff x="0" y="0"/>
+          <a:chExt cx="0" cy="0"/>
+        </a:xfrm>
+      </p:grpSpPr>
+      <p:sp>
+        <p:nvSpPr>
+          <p:cNvPr id="2" name="幻灯片图像占位符 1"/>
+          <p:cNvSpPr>
+            <a:spLocks noGrp="1" noRot="1" noChangeAspect="1"/>
+          </p:cNvSpPr>
+          <p:nvPr>
+            <p:ph type="sldImg"/>
+          </p:nvPr>
+        </p:nvSpPr>
+        <p:spPr/>
+      </p:sp>
+      <p:sp>
+        <p:nvSpPr>
+          <p:cNvPr id="3" name="备注占位符 2"/>
+          <p:cNvSpPr>
+            <a:spLocks noGrp="1"/>
+          </p:cNvSpPr>
+          <p:nvPr>
+            <p:ph type="body" idx="1"/>
+          </p:nvPr>
+        </p:nvSpPr>
+        <p:spPr/>
+        <p:txBody>
+          <a:bodyPr/>
+          <a:lstStyle/>
+          <a:p>
+            <a:endParaRPr lang="zh-CN" altLang="en-US"/>
+          </a:p>
+        </p:txBody>
+      </p:sp>
+      <p:sp>
+        <p:nvSpPr>
+          <p:cNvPr id="4" name="灯片编号占位符 3"/>
+          <p:cNvSpPr>
+            <a:spLocks noGrp="1"/>
+          </p:cNvSpPr>
+          <p:nvPr>
+            <p:ph type="sldNum" sz="quarter" idx="10"/>
+          </p:nvPr>
+        </p:nvSpPr>
+        <p:spPr/>
+        <p:txBody>
+          <a:bodyPr/>
+          <a:lstStyle/>
+          <a:p>
+            <a:fld id="{26F4831F-6F0E-43EF-BED8-BEEBB84EC01E}" type="slidenum">
+              <a:rPr lang="zh-CN" altLang="en-US" smtClean="0"/>
+              <a:t>23</a:t>
+            </a:fld>
+            <a:endParaRPr lang="zh-CN" altLang="en-US"/>
+          </a:p>
+        </p:txBody>
+      </p:sp>
+    </p:spTree>
+    <p:extLst>
+      <p:ext uri="{BB962C8B-B14F-4D97-AF65-F5344CB8AC3E}">
+        <p14:creationId xmlns:p14="http://schemas.microsoft.com/office/powerpoint/2010/main" val="1082322648"/>
+      </p:ext>
+    </p:extLst>
+  </p:cSld>
+  <p:clrMapOvr>
+    <a:masterClrMapping/>
+  </p:clrMapOvr>
+</p:notes>
+</file>
+
+<file path=ppt/notesSlides/notesSlide24.xml><?xml version="1.0" encoding="utf-8"?>
+<p:notes xmlns:a="http://schemas.openxmlformats.org/drawingml/2006/main" xmlns:r="http://schemas.openxmlformats.org/officeDocument/2006/relationships" xmlns:p="http://schemas.openxmlformats.org/presentationml/2006/main">
+  <p:cSld>
+    <p:spTree>
+      <p:nvGrpSpPr>
+        <p:cNvPr id="1" name=""/>
+        <p:cNvGrpSpPr/>
+        <p:nvPr/>
+      </p:nvGrpSpPr>
+      <p:grpSpPr>
+        <a:xfrm>
+          <a:off x="0" y="0"/>
+          <a:ext cx="0" cy="0"/>
+          <a:chOff x="0" y="0"/>
+          <a:chExt cx="0" cy="0"/>
+        </a:xfrm>
+      </p:grpSpPr>
+      <p:sp>
+        <p:nvSpPr>
+          <p:cNvPr id="2" name="幻灯片图像占位符 1"/>
+          <p:cNvSpPr>
+            <a:spLocks noGrp="1" noRot="1" noChangeAspect="1"/>
+          </p:cNvSpPr>
+          <p:nvPr>
+            <p:ph type="sldImg"/>
+          </p:nvPr>
+        </p:nvSpPr>
+        <p:spPr/>
+      </p:sp>
+      <p:sp>
+        <p:nvSpPr>
+          <p:cNvPr id="3" name="备注占位符 2"/>
+          <p:cNvSpPr>
+            <a:spLocks noGrp="1"/>
+          </p:cNvSpPr>
+          <p:nvPr>
+            <p:ph type="body" idx="1"/>
+          </p:nvPr>
+        </p:nvSpPr>
+        <p:spPr/>
+        <p:txBody>
+          <a:bodyPr/>
+          <a:lstStyle/>
+          <a:p>
+            <a:endParaRPr lang="zh-CN" altLang="en-US"/>
+          </a:p>
+        </p:txBody>
+      </p:sp>
+      <p:sp>
+        <p:nvSpPr>
+          <p:cNvPr id="4" name="灯片编号占位符 3"/>
+          <p:cNvSpPr>
+            <a:spLocks noGrp="1"/>
+          </p:cNvSpPr>
+          <p:nvPr>
+            <p:ph type="sldNum" sz="quarter" idx="10"/>
+          </p:nvPr>
+        </p:nvSpPr>
+        <p:spPr/>
+        <p:txBody>
+          <a:bodyPr/>
+          <a:lstStyle/>
+          <a:p>
+            <a:fld id="{26F4831F-6F0E-43EF-BED8-BEEBB84EC01E}" type="slidenum">
+              <a:rPr lang="zh-CN" altLang="en-US" smtClean="0"/>
+              <a:t>24</a:t>
+            </a:fld>
+            <a:endParaRPr lang="zh-CN" altLang="en-US"/>
+          </a:p>
+        </p:txBody>
+      </p:sp>
+    </p:spTree>
+    <p:extLst>
+      <p:ext uri="{BB962C8B-B14F-4D97-AF65-F5344CB8AC3E}">
+        <p14:creationId xmlns:p14="http://schemas.microsoft.com/office/powerpoint/2010/main" val="295174620"/>
+      </p:ext>
+    </p:extLst>
+  </p:cSld>
+  <p:clrMapOvr>
+    <a:masterClrMapping/>
+  </p:clrMapOvr>
+</p:notes>
+</file>
+
+<file path=ppt/notesSlides/notesSlide25.xml><?xml version="1.0" encoding="utf-8"?>
+<p:notes xmlns:a="http://schemas.openxmlformats.org/drawingml/2006/main" xmlns:r="http://schemas.openxmlformats.org/officeDocument/2006/relationships" xmlns:p="http://schemas.openxmlformats.org/presentationml/2006/main">
+  <p:cSld>
+    <p:spTree>
+      <p:nvGrpSpPr>
+        <p:cNvPr id="1" name=""/>
+        <p:cNvGrpSpPr/>
+        <p:nvPr/>
+      </p:nvGrpSpPr>
+      <p:grpSpPr>
+        <a:xfrm>
+          <a:off x="0" y="0"/>
+          <a:ext cx="0" cy="0"/>
+          <a:chOff x="0" y="0"/>
+          <a:chExt cx="0" cy="0"/>
+        </a:xfrm>
+      </p:grpSpPr>
+      <p:sp>
+        <p:nvSpPr>
+          <p:cNvPr id="2" name="幻灯片图像占位符 1"/>
+          <p:cNvSpPr>
+            <a:spLocks noGrp="1" noRot="1" noChangeAspect="1"/>
+          </p:cNvSpPr>
+          <p:nvPr>
+            <p:ph type="sldImg"/>
+          </p:nvPr>
+        </p:nvSpPr>
+        <p:spPr/>
+      </p:sp>
+      <p:sp>
+        <p:nvSpPr>
+          <p:cNvPr id="3" name="备注占位符 2"/>
+          <p:cNvSpPr>
+            <a:spLocks noGrp="1"/>
+          </p:cNvSpPr>
+          <p:nvPr>
+            <p:ph type="body" idx="1"/>
+          </p:nvPr>
+        </p:nvSpPr>
+        <p:spPr/>
+        <p:txBody>
+          <a:bodyPr/>
+          <a:lstStyle/>
+          <a:p>
+            <a:endParaRPr lang="zh-CN" altLang="en-US"/>
+          </a:p>
+        </p:txBody>
+      </p:sp>
+      <p:sp>
+        <p:nvSpPr>
+          <p:cNvPr id="4" name="灯片编号占位符 3"/>
+          <p:cNvSpPr>
+            <a:spLocks noGrp="1"/>
+          </p:cNvSpPr>
+          <p:nvPr>
+            <p:ph type="sldNum" sz="quarter" idx="10"/>
+          </p:nvPr>
+        </p:nvSpPr>
+        <p:spPr/>
+        <p:txBody>
+          <a:bodyPr/>
+          <a:lstStyle/>
+          <a:p>
+            <a:fld id="{26F4831F-6F0E-43EF-BED8-BEEBB84EC01E}" type="slidenum">
+              <a:rPr lang="zh-CN" altLang="en-US" smtClean="0"/>
+              <a:t>25</a:t>
+            </a:fld>
+            <a:endParaRPr lang="zh-CN" altLang="en-US"/>
+          </a:p>
+        </p:txBody>
+      </p:sp>
+    </p:spTree>
+    <p:extLst>
+      <p:ext uri="{BB962C8B-B14F-4D97-AF65-F5344CB8AC3E}">
+        <p14:creationId xmlns:p14="http://schemas.microsoft.com/office/powerpoint/2010/main" val="3903612671"/>
+      </p:ext>
+    </p:extLst>
+  </p:cSld>
+  <p:clrMapOvr>
+    <a:masterClrMapping/>
+  </p:clrMapOvr>
+</p:notes>
+</file>
+
+<file path=ppt/notesSlides/notesSlide26.xml><?xml version="1.0" encoding="utf-8"?>
+<p:notes xmlns:a="http://schemas.openxmlformats.org/drawingml/2006/main" xmlns:r="http://schemas.openxmlformats.org/officeDocument/2006/relationships" xmlns:p="http://schemas.openxmlformats.org/presentationml/2006/main">
+  <p:cSld>
+    <p:spTree>
+      <p:nvGrpSpPr>
+        <p:cNvPr id="1" name=""/>
+        <p:cNvGrpSpPr/>
+        <p:nvPr/>
+      </p:nvGrpSpPr>
+      <p:grpSpPr>
+        <a:xfrm>
+          <a:off x="0" y="0"/>
+          <a:ext cx="0" cy="0"/>
+          <a:chOff x="0" y="0"/>
+          <a:chExt cx="0" cy="0"/>
+        </a:xfrm>
+      </p:grpSpPr>
+      <p:sp>
+        <p:nvSpPr>
+          <p:cNvPr id="2" name="幻灯片图像占位符 1"/>
+          <p:cNvSpPr>
+            <a:spLocks noGrp="1" noRot="1" noChangeAspect="1"/>
+          </p:cNvSpPr>
+          <p:nvPr>
+            <p:ph type="sldImg"/>
+          </p:nvPr>
+        </p:nvSpPr>
+        <p:spPr/>
+      </p:sp>
+      <p:sp>
+        <p:nvSpPr>
+          <p:cNvPr id="3" name="备注占位符 2"/>
+          <p:cNvSpPr>
+            <a:spLocks noGrp="1"/>
+          </p:cNvSpPr>
+          <p:nvPr>
+            <p:ph type="body" idx="1"/>
+          </p:nvPr>
+        </p:nvSpPr>
+        <p:spPr/>
+        <p:txBody>
+          <a:bodyPr/>
+          <a:lstStyle/>
+          <a:p>
+            <a:endParaRPr lang="zh-CN" altLang="en-US"/>
+          </a:p>
+        </p:txBody>
+      </p:sp>
+      <p:sp>
+        <p:nvSpPr>
+          <p:cNvPr id="4" name="灯片编号占位符 3"/>
+          <p:cNvSpPr>
+            <a:spLocks noGrp="1"/>
+          </p:cNvSpPr>
+          <p:nvPr>
+            <p:ph type="sldNum" sz="quarter" idx="10"/>
+          </p:nvPr>
+        </p:nvSpPr>
+        <p:spPr/>
+        <p:txBody>
+          <a:bodyPr/>
+          <a:lstStyle/>
+          <a:p>
+            <a:fld id="{26F4831F-6F0E-43EF-BED8-BEEBB84EC01E}" type="slidenum">
+              <a:rPr lang="zh-CN" altLang="en-US" smtClean="0"/>
+              <a:t>26</a:t>
+            </a:fld>
+            <a:endParaRPr lang="zh-CN" altLang="en-US"/>
+          </a:p>
+        </p:txBody>
+      </p:sp>
+    </p:spTree>
+    <p:extLst>
+      <p:ext uri="{BB962C8B-B14F-4D97-AF65-F5344CB8AC3E}">
+        <p14:creationId xmlns:p14="http://schemas.microsoft.com/office/powerpoint/2010/main" val="2583067087"/>
+      </p:ext>
+    </p:extLst>
+  </p:cSld>
+  <p:clrMapOvr>
+    <a:masterClrMapping/>
+  </p:clrMapOvr>
+</p:notes>
+</file>
+
+<file path=ppt/notesSlides/notesSlide27.xml><?xml version="1.0" encoding="utf-8"?>
+<p:notes xmlns:a="http://schemas.openxmlformats.org/drawingml/2006/main" xmlns:r="http://schemas.openxmlformats.org/officeDocument/2006/relationships" xmlns:p="http://schemas.openxmlformats.org/presentationml/2006/main">
+  <p:cSld>
+    <p:spTree>
+      <p:nvGrpSpPr>
+        <p:cNvPr id="1" name=""/>
+        <p:cNvGrpSpPr/>
+        <p:nvPr/>
+      </p:nvGrpSpPr>
+      <p:grpSpPr>
+        <a:xfrm>
+          <a:off x="0" y="0"/>
+          <a:ext cx="0" cy="0"/>
+          <a:chOff x="0" y="0"/>
+          <a:chExt cx="0" cy="0"/>
+        </a:xfrm>
+      </p:grpSpPr>
+      <p:sp>
+        <p:nvSpPr>
+          <p:cNvPr id="2" name="幻灯片图像占位符 1"/>
+          <p:cNvSpPr>
+            <a:spLocks noGrp="1" noRot="1" noChangeAspect="1"/>
+          </p:cNvSpPr>
+          <p:nvPr>
+            <p:ph type="sldImg"/>
+          </p:nvPr>
+        </p:nvSpPr>
+        <p:spPr/>
+      </p:sp>
+      <p:sp>
+        <p:nvSpPr>
+          <p:cNvPr id="3" name="备注占位符 2"/>
+          <p:cNvSpPr>
+            <a:spLocks noGrp="1"/>
+          </p:cNvSpPr>
+          <p:nvPr>
+            <p:ph type="body" idx="1"/>
+          </p:nvPr>
+        </p:nvSpPr>
+        <p:spPr/>
+        <p:txBody>
+          <a:bodyPr/>
+          <a:lstStyle/>
+          <a:p>
+            <a:endParaRPr lang="zh-CN" altLang="en-US"/>
+          </a:p>
+        </p:txBody>
+      </p:sp>
+      <p:sp>
+        <p:nvSpPr>
+          <p:cNvPr id="4" name="灯片编号占位符 3"/>
+          <p:cNvSpPr>
+            <a:spLocks noGrp="1"/>
+          </p:cNvSpPr>
+          <p:nvPr>
+            <p:ph type="sldNum" sz="quarter" idx="10"/>
+          </p:nvPr>
+        </p:nvSpPr>
+        <p:spPr/>
+        <p:txBody>
+          <a:bodyPr/>
+          <a:lstStyle/>
+          <a:p>
+            <a:fld id="{26F4831F-6F0E-43EF-BED8-BEEBB84EC01E}" type="slidenum">
+              <a:rPr lang="zh-CN" altLang="en-US" smtClean="0"/>
+              <a:t>27</a:t>
+            </a:fld>
+            <a:endParaRPr lang="zh-CN" altLang="en-US"/>
+          </a:p>
+        </p:txBody>
+      </p:sp>
+    </p:spTree>
+    <p:extLst>
+      <p:ext uri="{BB962C8B-B14F-4D97-AF65-F5344CB8AC3E}">
+        <p14:creationId xmlns:p14="http://schemas.microsoft.com/office/powerpoint/2010/main" val="3084103180"/>
+      </p:ext>
+    </p:extLst>
+  </p:cSld>
+  <p:clrMapOvr>
+    <a:masterClrMapping/>
+  </p:clrMapOvr>
+</p:notes>
+</file>
+
+<file path=ppt/notesSlides/notesSlide28.xml><?xml version="1.0" encoding="utf-8"?>
+<p:notes xmlns:a="http://schemas.openxmlformats.org/drawingml/2006/main" xmlns:r="http://schemas.openxmlformats.org/officeDocument/2006/relationships" xmlns:p="http://schemas.openxmlformats.org/presentationml/2006/main">
+  <p:cSld>
+    <p:spTree>
+      <p:nvGrpSpPr>
+        <p:cNvPr id="1" name=""/>
+        <p:cNvGrpSpPr/>
+        <p:nvPr/>
+      </p:nvGrpSpPr>
+      <p:grpSpPr>
+        <a:xfrm>
+          <a:off x="0" y="0"/>
+          <a:ext cx="0" cy="0"/>
+          <a:chOff x="0" y="0"/>
+          <a:chExt cx="0" cy="0"/>
+        </a:xfrm>
+      </p:grpSpPr>
+      <p:sp>
+        <p:nvSpPr>
+          <p:cNvPr id="2" name="幻灯片图像占位符 1"/>
+          <p:cNvSpPr>
+            <a:spLocks noGrp="1" noRot="1" noChangeAspect="1"/>
+          </p:cNvSpPr>
+          <p:nvPr>
+            <p:ph type="sldImg"/>
+          </p:nvPr>
+        </p:nvSpPr>
+        <p:spPr/>
+      </p:sp>
+      <p:sp>
+        <p:nvSpPr>
+          <p:cNvPr id="3" name="备注占位符 2"/>
+          <p:cNvSpPr>
+            <a:spLocks noGrp="1"/>
+          </p:cNvSpPr>
+          <p:nvPr>
+            <p:ph type="body" idx="1"/>
+          </p:nvPr>
+        </p:nvSpPr>
+        <p:spPr/>
+        <p:txBody>
+          <a:bodyPr/>
+          <a:lstStyle/>
+          <a:p>
+            <a:endParaRPr lang="zh-CN" altLang="en-US"/>
+          </a:p>
+        </p:txBody>
+      </p:sp>
+      <p:sp>
+        <p:nvSpPr>
+          <p:cNvPr id="4" name="灯片编号占位符 3"/>
+          <p:cNvSpPr>
+            <a:spLocks noGrp="1"/>
+          </p:cNvSpPr>
+          <p:nvPr>
+            <p:ph type="sldNum" sz="quarter" idx="10"/>
+          </p:nvPr>
+        </p:nvSpPr>
+        <p:spPr/>
+        <p:txBody>
+          <a:bodyPr/>
+          <a:lstStyle/>
+          <a:p>
+            <a:fld id="{26F4831F-6F0E-43EF-BED8-BEEBB84EC01E}" type="slidenum">
+              <a:rPr lang="zh-CN" altLang="en-US" smtClean="0"/>
+              <a:t>28</a:t>
+            </a:fld>
+            <a:endParaRPr lang="zh-CN" altLang="en-US"/>
+          </a:p>
+        </p:txBody>
+      </p:sp>
+    </p:spTree>
+    <p:extLst>
+      <p:ext uri="{BB962C8B-B14F-4D97-AF65-F5344CB8AC3E}">
+        <p14:creationId xmlns:p14="http://schemas.microsoft.com/office/powerpoint/2010/main" val="1292339084"/>
+      </p:ext>
+    </p:extLst>
+  </p:cSld>
+  <p:clrMapOvr>
+    <a:masterClrMapping/>
+  </p:clrMapOvr>
+</p:notes>
+</file>
+
+<file path=ppt/notesSlides/notesSlide29.xml><?xml version="1.0" encoding="utf-8"?>
+<p:notes xmlns:a="http://schemas.openxmlformats.org/drawingml/2006/main" xmlns:r="http://schemas.openxmlformats.org/officeDocument/2006/relationships" xmlns:p="http://schemas.openxmlformats.org/presentationml/2006/main">
+  <p:cSld>
+    <p:spTree>
+      <p:nvGrpSpPr>
+        <p:cNvPr id="1" name=""/>
+        <p:cNvGrpSpPr/>
+        <p:nvPr/>
+      </p:nvGrpSpPr>
+      <p:grpSpPr>
+        <a:xfrm>
+          <a:off x="0" y="0"/>
+          <a:ext cx="0" cy="0"/>
+          <a:chOff x="0" y="0"/>
+          <a:chExt cx="0" cy="0"/>
+        </a:xfrm>
+      </p:grpSpPr>
+      <p:sp>
+        <p:nvSpPr>
+          <p:cNvPr id="2" name="幻灯片图像占位符 1"/>
+          <p:cNvSpPr>
+            <a:spLocks noGrp="1" noRot="1" noChangeAspect="1"/>
+          </p:cNvSpPr>
+          <p:nvPr>
+            <p:ph type="sldImg"/>
+          </p:nvPr>
+        </p:nvSpPr>
+        <p:spPr/>
+      </p:sp>
+      <p:sp>
+        <p:nvSpPr>
+          <p:cNvPr id="3" name="备注占位符 2"/>
+          <p:cNvSpPr>
+            <a:spLocks noGrp="1"/>
+          </p:cNvSpPr>
+          <p:nvPr>
+            <p:ph type="body" idx="1"/>
+          </p:nvPr>
+        </p:nvSpPr>
+        <p:spPr/>
+        <p:txBody>
+          <a:bodyPr/>
+          <a:lstStyle/>
+          <a:p>
+            <a:endParaRPr lang="zh-CN" altLang="en-US"/>
+          </a:p>
+        </p:txBody>
+      </p:sp>
+      <p:sp>
+        <p:nvSpPr>
+          <p:cNvPr id="4" name="灯片编号占位符 3"/>
+          <p:cNvSpPr>
+            <a:spLocks noGrp="1"/>
+          </p:cNvSpPr>
+          <p:nvPr>
+            <p:ph type="sldNum" sz="quarter" idx="10"/>
+          </p:nvPr>
+        </p:nvSpPr>
+        <p:spPr/>
+        <p:txBody>
+          <a:bodyPr/>
+          <a:lstStyle/>
+          <a:p>
+            <a:fld id="{26F4831F-6F0E-43EF-BED8-BEEBB84EC01E}" type="slidenum">
+              <a:rPr lang="zh-CN" altLang="en-US" smtClean="0"/>
+              <a:t>29</a:t>
+            </a:fld>
+            <a:endParaRPr lang="zh-CN" altLang="en-US"/>
+          </a:p>
+        </p:txBody>
+      </p:sp>
+    </p:spTree>
+    <p:extLst>
+      <p:ext uri="{BB962C8B-B14F-4D97-AF65-F5344CB8AC3E}">
+        <p14:creationId xmlns:p14="http://schemas.microsoft.com/office/powerpoint/2010/main" val="3289334157"/>
+      </p:ext>
+    </p:extLst>
+  </p:cSld>
+  <p:clrMapOvr>
+    <a:masterClrMapping/>
+  </p:clrMapOvr>
+</p:notes>
+</file>
+
+<file path=ppt/notesSlides/notesSlide3.xml><?xml version="1.0" encoding="utf-8"?>
+<p:notes xmlns:a="http://schemas.openxmlformats.org/drawingml/2006/main" xmlns:r="http://schemas.openxmlformats.org/officeDocument/2006/relationships" xmlns:p="http://schemas.openxmlformats.org/presentationml/2006/main">
+  <p:cSld>
+    <p:spTree>
+      <p:nvGrpSpPr>
+        <p:cNvPr id="1" name=""/>
+        <p:cNvGrpSpPr/>
+        <p:nvPr/>
+      </p:nvGrpSpPr>
+      <p:grpSpPr>
+        <a:xfrm>
+          <a:off x="0" y="0"/>
+          <a:ext cx="0" cy="0"/>
+          <a:chOff x="0" y="0"/>
+          <a:chExt cx="0" cy="0"/>
+        </a:xfrm>
+      </p:grpSpPr>
+      <p:sp>
+        <p:nvSpPr>
+          <p:cNvPr id="2" name="幻灯片图像占位符 1"/>
+          <p:cNvSpPr>
+            <a:spLocks noGrp="1" noRot="1" noChangeAspect="1"/>
+          </p:cNvSpPr>
+          <p:nvPr>
+            <p:ph type="sldImg"/>
+          </p:nvPr>
+        </p:nvSpPr>
+        <p:spPr/>
+      </p:sp>
+      <p:sp>
+        <p:nvSpPr>
+          <p:cNvPr id="3" name="备注占位符 2"/>
+          <p:cNvSpPr>
+            <a:spLocks noGrp="1"/>
+          </p:cNvSpPr>
+          <p:nvPr>
+            <p:ph type="body" idx="1"/>
+          </p:nvPr>
+        </p:nvSpPr>
+        <p:spPr/>
+        <p:txBody>
+          <a:bodyPr/>
+          <a:lstStyle/>
+          <a:p>
+            <a:endParaRPr lang="zh-CN" altLang="en-US"/>
+          </a:p>
+        </p:txBody>
+      </p:sp>
+      <p:sp>
+        <p:nvSpPr>
+          <p:cNvPr id="4" name="灯片编号占位符 3"/>
+          <p:cNvSpPr>
+            <a:spLocks noGrp="1"/>
+          </p:cNvSpPr>
+          <p:nvPr>
+            <p:ph type="sldNum" sz="quarter" idx="10"/>
+          </p:nvPr>
+        </p:nvSpPr>
+        <p:spPr/>
+        <p:txBody>
+          <a:bodyPr/>
+          <a:lstStyle/>
+          <a:p>
+            <a:fld id="{26F4831F-6F0E-43EF-BED8-BEEBB84EC01E}" type="slidenum">
+              <a:rPr lang="zh-CN" altLang="en-US" smtClean="0"/>
+              <a:t>3</a:t>
+            </a:fld>
+            <a:endParaRPr lang="zh-CN" altLang="en-US"/>
+          </a:p>
+        </p:txBody>
+      </p:sp>
+    </p:spTree>
+    <p:extLst>
+      <p:ext uri="{BB962C8B-B14F-4D97-AF65-F5344CB8AC3E}">
+        <p14:creationId xmlns:p14="http://schemas.microsoft.com/office/powerpoint/2010/main" val="1797137535"/>
+      </p:ext>
+    </p:extLst>
+  </p:cSld>
+  <p:clrMapOvr>
+    <a:masterClrMapping/>
+  </p:clrMapOvr>
+</p:notes>
+</file>
+
+<file path=ppt/notesSlides/notesSlide30.xml><?xml version="1.0" encoding="utf-8"?>
+<p:notes xmlns:a="http://schemas.openxmlformats.org/drawingml/2006/main" xmlns:r="http://schemas.openxmlformats.org/officeDocument/2006/relationships" xmlns:p="http://schemas.openxmlformats.org/presentationml/2006/main">
+  <p:cSld>
+    <p:spTree>
+      <p:nvGrpSpPr>
+        <p:cNvPr id="1" name=""/>
+        <p:cNvGrpSpPr/>
+        <p:nvPr/>
+      </p:nvGrpSpPr>
+      <p:grpSpPr>
+        <a:xfrm>
+          <a:off x="0" y="0"/>
+          <a:ext cx="0" cy="0"/>
+          <a:chOff x="0" y="0"/>
+          <a:chExt cx="0" cy="0"/>
+        </a:xfrm>
+      </p:grpSpPr>
+      <p:sp>
+        <p:nvSpPr>
+          <p:cNvPr id="2" name="幻灯片图像占位符 1"/>
+          <p:cNvSpPr>
+            <a:spLocks noGrp="1" noRot="1" noChangeAspect="1"/>
+          </p:cNvSpPr>
+          <p:nvPr>
+            <p:ph type="sldImg"/>
+          </p:nvPr>
+        </p:nvSpPr>
+        <p:spPr/>
+      </p:sp>
+      <p:sp>
+        <p:nvSpPr>
+          <p:cNvPr id="3" name="备注占位符 2"/>
+          <p:cNvSpPr>
+            <a:spLocks noGrp="1"/>
+          </p:cNvSpPr>
+          <p:nvPr>
+            <p:ph type="body" idx="1"/>
+          </p:nvPr>
+        </p:nvSpPr>
+        <p:spPr/>
+        <p:txBody>
+          <a:bodyPr/>
+          <a:lstStyle/>
+          <a:p>
+            <a:endParaRPr lang="zh-CN" altLang="en-US"/>
+          </a:p>
+        </p:txBody>
+      </p:sp>
+      <p:sp>
+        <p:nvSpPr>
+          <p:cNvPr id="4" name="灯片编号占位符 3"/>
+          <p:cNvSpPr>
+            <a:spLocks noGrp="1"/>
+          </p:cNvSpPr>
+          <p:nvPr>
+            <p:ph type="sldNum" sz="quarter" idx="10"/>
+          </p:nvPr>
+        </p:nvSpPr>
+        <p:spPr/>
+        <p:txBody>
+          <a:bodyPr/>
+          <a:lstStyle/>
+          <a:p>
+            <a:fld id="{26F4831F-6F0E-43EF-BED8-BEEBB84EC01E}" type="slidenum">
+              <a:rPr lang="zh-CN" altLang="en-US" smtClean="0"/>
+              <a:t>30</a:t>
+            </a:fld>
+            <a:endParaRPr lang="zh-CN" altLang="en-US"/>
+          </a:p>
+        </p:txBody>
+      </p:sp>
+    </p:spTree>
+    <p:extLst>
+      <p:ext uri="{BB962C8B-B14F-4D97-AF65-F5344CB8AC3E}">
+        <p14:creationId xmlns:p14="http://schemas.microsoft.com/office/powerpoint/2010/main" val="3814202391"/>
+      </p:ext>
+    </p:extLst>
+  </p:cSld>
+  <p:clrMapOvr>
+    <a:masterClrMapping/>
+  </p:clrMapOvr>
+</p:notes>
+</file>
+
+<file path=ppt/notesSlides/notesSlide31.xml><?xml version="1.0" encoding="utf-8"?>
+<p:notes xmlns:a="http://schemas.openxmlformats.org/drawingml/2006/main" xmlns:r="http://schemas.openxmlformats.org/officeDocument/2006/relationships" xmlns:p="http://schemas.openxmlformats.org/presentationml/2006/main">
+  <p:cSld>
+    <p:spTree>
+      <p:nvGrpSpPr>
+        <p:cNvPr id="1" name=""/>
+        <p:cNvGrpSpPr/>
+        <p:nvPr/>
+      </p:nvGrpSpPr>
+      <p:grpSpPr>
+        <a:xfrm>
+          <a:off x="0" y="0"/>
+          <a:ext cx="0" cy="0"/>
+          <a:chOff x="0" y="0"/>
+          <a:chExt cx="0" cy="0"/>
+        </a:xfrm>
+      </p:grpSpPr>
+      <p:sp>
+        <p:nvSpPr>
+          <p:cNvPr id="2" name="幻灯片图像占位符 1"/>
+          <p:cNvSpPr>
+            <a:spLocks noGrp="1" noRot="1" noChangeAspect="1"/>
+          </p:cNvSpPr>
+          <p:nvPr>
+            <p:ph type="sldImg"/>
+          </p:nvPr>
+        </p:nvSpPr>
+        <p:spPr/>
+      </p:sp>
+      <p:sp>
+        <p:nvSpPr>
+          <p:cNvPr id="3" name="备注占位符 2"/>
+          <p:cNvSpPr>
+            <a:spLocks noGrp="1"/>
+          </p:cNvSpPr>
+          <p:nvPr>
+            <p:ph type="body" idx="1"/>
+          </p:nvPr>
+        </p:nvSpPr>
+        <p:spPr/>
+        <p:txBody>
+          <a:bodyPr/>
+          <a:lstStyle/>
+          <a:p>
+            <a:endParaRPr lang="zh-CN" altLang="en-US"/>
+          </a:p>
+        </p:txBody>
+      </p:sp>
+      <p:sp>
+        <p:nvSpPr>
+          <p:cNvPr id="4" name="灯片编号占位符 3"/>
+          <p:cNvSpPr>
+            <a:spLocks noGrp="1"/>
+          </p:cNvSpPr>
+          <p:nvPr>
+            <p:ph type="sldNum" sz="quarter" idx="10"/>
+          </p:nvPr>
+        </p:nvSpPr>
+        <p:spPr/>
+        <p:txBody>
+          <a:bodyPr/>
+          <a:lstStyle/>
+          <a:p>
+            <a:fld id="{26F4831F-6F0E-43EF-BED8-BEEBB84EC01E}" type="slidenum">
+              <a:rPr lang="zh-CN" altLang="en-US" smtClean="0"/>
+              <a:t>31</a:t>
+            </a:fld>
+            <a:endParaRPr lang="zh-CN" altLang="en-US"/>
+          </a:p>
+        </p:txBody>
+      </p:sp>
+    </p:spTree>
+    <p:extLst>
+      <p:ext uri="{BB962C8B-B14F-4D97-AF65-F5344CB8AC3E}">
+        <p14:creationId xmlns:p14="http://schemas.microsoft.com/office/powerpoint/2010/main" val="2794471684"/>
+      </p:ext>
+    </p:extLst>
+  </p:cSld>
+  <p:clrMapOvr>
+    <a:masterClrMapping/>
+  </p:clrMapOvr>
+</p:notes>
+</file>
+
+<file path=ppt/notesSlides/notesSlide32.xml><?xml version="1.0" encoding="utf-8"?>
+<p:notes xmlns:a="http://schemas.openxmlformats.org/drawingml/2006/main" xmlns:r="http://schemas.openxmlformats.org/officeDocument/2006/relationships" xmlns:p="http://schemas.openxmlformats.org/presentationml/2006/main">
+  <p:cSld>
+    <p:spTree>
+      <p:nvGrpSpPr>
+        <p:cNvPr id="1" name=""/>
+        <p:cNvGrpSpPr/>
+        <p:nvPr/>
+      </p:nvGrpSpPr>
+      <p:grpSpPr>
+        <a:xfrm>
+          <a:off x="0" y="0"/>
+          <a:ext cx="0" cy="0"/>
+          <a:chOff x="0" y="0"/>
+          <a:chExt cx="0" cy="0"/>
+        </a:xfrm>
+      </p:grpSpPr>
+      <p:sp>
+        <p:nvSpPr>
+          <p:cNvPr id="2" name="幻灯片图像占位符 1"/>
+          <p:cNvSpPr>
+            <a:spLocks noGrp="1" noRot="1" noChangeAspect="1"/>
+          </p:cNvSpPr>
+          <p:nvPr>
+            <p:ph type="sldImg"/>
+          </p:nvPr>
+        </p:nvSpPr>
+        <p:spPr/>
+      </p:sp>
+      <p:sp>
+        <p:nvSpPr>
+          <p:cNvPr id="3" name="备注占位符 2"/>
+          <p:cNvSpPr>
+            <a:spLocks noGrp="1"/>
+          </p:cNvSpPr>
+          <p:nvPr>
+            <p:ph type="body" idx="1"/>
+          </p:nvPr>
+        </p:nvSpPr>
+        <p:spPr/>
+        <p:txBody>
+          <a:bodyPr/>
+          <a:lstStyle/>
+          <a:p>
+            <a:endParaRPr lang="zh-CN" altLang="en-US"/>
+          </a:p>
+        </p:txBody>
+      </p:sp>
+      <p:sp>
+        <p:nvSpPr>
+          <p:cNvPr id="4" name="灯片编号占位符 3"/>
+          <p:cNvSpPr>
+            <a:spLocks noGrp="1"/>
+          </p:cNvSpPr>
+          <p:nvPr>
+            <p:ph type="sldNum" sz="quarter" idx="10"/>
+          </p:nvPr>
+        </p:nvSpPr>
+        <p:spPr/>
+        <p:txBody>
+          <a:bodyPr/>
+          <a:lstStyle/>
+          <a:p>
+            <a:fld id="{26F4831F-6F0E-43EF-BED8-BEEBB84EC01E}" type="slidenum">
+              <a:rPr lang="zh-CN" altLang="en-US" smtClean="0"/>
+              <a:t>32</a:t>
+            </a:fld>
+            <a:endParaRPr lang="zh-CN" altLang="en-US"/>
+          </a:p>
+        </p:txBody>
+      </p:sp>
+    </p:spTree>
+    <p:extLst>
+      <p:ext uri="{BB962C8B-B14F-4D97-AF65-F5344CB8AC3E}">
+        <p14:creationId xmlns:p14="http://schemas.microsoft.com/office/powerpoint/2010/main" val="2880391790"/>
+      </p:ext>
+    </p:extLst>
+  </p:cSld>
+  <p:clrMapOvr>
+    <a:masterClrMapping/>
+  </p:clrMapOvr>
+</p:notes>
+</file>
+
+<file path=ppt/notesSlides/notesSlide33.xml><?xml version="1.0" encoding="utf-8"?>
+<p:notes xmlns:a="http://schemas.openxmlformats.org/drawingml/2006/main" xmlns:r="http://schemas.openxmlformats.org/officeDocument/2006/relationships" xmlns:p="http://schemas.openxmlformats.org/presentationml/2006/main">
+  <p:cSld>
+    <p:spTree>
+      <p:nvGrpSpPr>
+        <p:cNvPr id="1" name=""/>
+        <p:cNvGrpSpPr/>
+        <p:nvPr/>
+      </p:nvGrpSpPr>
+      <p:grpSpPr>
+        <a:xfrm>
+          <a:off x="0" y="0"/>
+          <a:ext cx="0" cy="0"/>
+          <a:chOff x="0" y="0"/>
+          <a:chExt cx="0" cy="0"/>
+        </a:xfrm>
+      </p:grpSpPr>
+      <p:sp>
+        <p:nvSpPr>
+          <p:cNvPr id="2" name="幻灯片图像占位符 1"/>
+          <p:cNvSpPr>
+            <a:spLocks noGrp="1" noRot="1" noChangeAspect="1"/>
+          </p:cNvSpPr>
+          <p:nvPr>
+            <p:ph type="sldImg"/>
+          </p:nvPr>
+        </p:nvSpPr>
+        <p:spPr/>
+      </p:sp>
+      <p:sp>
+        <p:nvSpPr>
+          <p:cNvPr id="3" name="备注占位符 2"/>
+          <p:cNvSpPr>
+            <a:spLocks noGrp="1"/>
+          </p:cNvSpPr>
+          <p:nvPr>
+            <p:ph type="body" idx="1"/>
+          </p:nvPr>
+        </p:nvSpPr>
+        <p:spPr/>
+        <p:txBody>
+          <a:bodyPr/>
+          <a:lstStyle/>
+          <a:p>
+            <a:endParaRPr lang="zh-CN" altLang="en-US"/>
+          </a:p>
+        </p:txBody>
+      </p:sp>
+      <p:sp>
+        <p:nvSpPr>
+          <p:cNvPr id="4" name="灯片编号占位符 3"/>
+          <p:cNvSpPr>
+            <a:spLocks noGrp="1"/>
+          </p:cNvSpPr>
+          <p:nvPr>
+            <p:ph type="sldNum" sz="quarter" idx="10"/>
+          </p:nvPr>
+        </p:nvSpPr>
+        <p:spPr/>
+        <p:txBody>
+          <a:bodyPr/>
+          <a:lstStyle/>
+          <a:p>
+            <a:fld id="{26F4831F-6F0E-43EF-BED8-BEEBB84EC01E}" type="slidenum">
+              <a:rPr lang="zh-CN" altLang="en-US" smtClean="0"/>
+              <a:t>33</a:t>
+            </a:fld>
+            <a:endParaRPr lang="zh-CN" altLang="en-US"/>
+          </a:p>
+        </p:txBody>
+      </p:sp>
+    </p:spTree>
+    <p:extLst>
+      <p:ext uri="{BB962C8B-B14F-4D97-AF65-F5344CB8AC3E}">
+        <p14:creationId xmlns:p14="http://schemas.microsoft.com/office/powerpoint/2010/main" val="3312970360"/>
+      </p:ext>
+    </p:extLst>
+  </p:cSld>
+  <p:clrMapOvr>
+    <a:masterClrMapping/>
+  </p:clrMapOvr>
+</p:notes>
+</file>
+
+<file path=ppt/notesSlides/notesSlide34.xml><?xml version="1.0" encoding="utf-8"?>
+<p:notes xmlns:a="http://schemas.openxmlformats.org/drawingml/2006/main" xmlns:r="http://schemas.openxmlformats.org/officeDocument/2006/relationships" xmlns:p="http://schemas.openxmlformats.org/presentationml/2006/main">
+  <p:cSld>
+    <p:spTree>
+      <p:nvGrpSpPr>
+        <p:cNvPr id="1" name=""/>
+        <p:cNvGrpSpPr/>
+        <p:nvPr/>
+      </p:nvGrpSpPr>
+      <p:grpSpPr>
+        <a:xfrm>
+          <a:off x="0" y="0"/>
+          <a:ext cx="0" cy="0"/>
+          <a:chOff x="0" y="0"/>
+          <a:chExt cx="0" cy="0"/>
+        </a:xfrm>
+      </p:grpSpPr>
+      <p:sp>
+        <p:nvSpPr>
+          <p:cNvPr id="2" name="幻灯片图像占位符 1"/>
+          <p:cNvSpPr>
+            <a:spLocks noGrp="1" noRot="1" noChangeAspect="1"/>
+          </p:cNvSpPr>
+          <p:nvPr>
+            <p:ph type="sldImg"/>
+          </p:nvPr>
+        </p:nvSpPr>
+        <p:spPr/>
+      </p:sp>
+      <p:sp>
+        <p:nvSpPr>
+          <p:cNvPr id="3" name="备注占位符 2"/>
+          <p:cNvSpPr>
+            <a:spLocks noGrp="1"/>
+          </p:cNvSpPr>
+          <p:nvPr>
+            <p:ph type="body" idx="1"/>
+          </p:nvPr>
+        </p:nvSpPr>
+        <p:spPr/>
+        <p:txBody>
+          <a:bodyPr/>
+          <a:lstStyle/>
+          <a:p>
+            <a:endParaRPr lang="zh-CN" altLang="en-US"/>
+          </a:p>
+        </p:txBody>
+      </p:sp>
+      <p:sp>
+        <p:nvSpPr>
+          <p:cNvPr id="4" name="灯片编号占位符 3"/>
+          <p:cNvSpPr>
+            <a:spLocks noGrp="1"/>
+          </p:cNvSpPr>
+          <p:nvPr>
+            <p:ph type="sldNum" sz="quarter" idx="10"/>
+          </p:nvPr>
+        </p:nvSpPr>
+        <p:spPr/>
+        <p:txBody>
+          <a:bodyPr/>
+          <a:lstStyle/>
+          <a:p>
+            <a:fld id="{26F4831F-6F0E-43EF-BED8-BEEBB84EC01E}" type="slidenum">
+              <a:rPr lang="zh-CN" altLang="en-US" smtClean="0"/>
+              <a:t>34</a:t>
+            </a:fld>
+            <a:endParaRPr lang="zh-CN" altLang="en-US"/>
+          </a:p>
+        </p:txBody>
+      </p:sp>
+    </p:spTree>
+    <p:extLst>
+      <p:ext uri="{BB962C8B-B14F-4D97-AF65-F5344CB8AC3E}">
+        <p14:creationId xmlns:p14="http://schemas.microsoft.com/office/powerpoint/2010/main" val="3084040429"/>
+      </p:ext>
+    </p:extLst>
+  </p:cSld>
+  <p:clrMapOvr>
+    <a:masterClrMapping/>
+  </p:clrMapOvr>
+</p:notes>
+</file>
+
+<file path=ppt/notesSlides/notesSlide4.xml><?xml version="1.0" encoding="utf-8"?>
+<p:notes xmlns:a="http://schemas.openxmlformats.org/drawingml/2006/main" xmlns:r="http://schemas.openxmlformats.org/officeDocument/2006/relationships" xmlns:p="http://schemas.openxmlformats.org/presentationml/2006/main">
+  <p:cSld>
+    <p:spTree>
+      <p:nvGrpSpPr>
+        <p:cNvPr id="1" name=""/>
+        <p:cNvGrpSpPr/>
+        <p:nvPr/>
+      </p:nvGrpSpPr>
+      <p:grpSpPr>
+        <a:xfrm>
+          <a:off x="0" y="0"/>
+          <a:ext cx="0" cy="0"/>
+          <a:chOff x="0" y="0"/>
+          <a:chExt cx="0" cy="0"/>
+        </a:xfrm>
+      </p:grpSpPr>
+      <p:sp>
+        <p:nvSpPr>
+          <p:cNvPr id="2" name="幻灯片图像占位符 1"/>
+          <p:cNvSpPr>
+            <a:spLocks noGrp="1" noRot="1" noChangeAspect="1"/>
+          </p:cNvSpPr>
+          <p:nvPr>
+            <p:ph type="sldImg"/>
+          </p:nvPr>
+        </p:nvSpPr>
+        <p:spPr/>
+      </p:sp>
+      <p:sp>
+        <p:nvSpPr>
+          <p:cNvPr id="3" name="备注占位符 2"/>
+          <p:cNvSpPr>
+            <a:spLocks noGrp="1"/>
+          </p:cNvSpPr>
+          <p:nvPr>
+            <p:ph type="body" idx="1"/>
+          </p:nvPr>
+        </p:nvSpPr>
+        <p:spPr/>
+        <p:txBody>
+          <a:bodyPr/>
+          <a:lstStyle/>
+          <a:p>
+            <a:endParaRPr lang="zh-CN" altLang="en-US"/>
+          </a:p>
+        </p:txBody>
+      </p:sp>
+      <p:sp>
+        <p:nvSpPr>
+          <p:cNvPr id="4" name="灯片编号占位符 3"/>
+          <p:cNvSpPr>
+            <a:spLocks noGrp="1"/>
+          </p:cNvSpPr>
+          <p:nvPr>
+            <p:ph type="sldNum" sz="quarter" idx="10"/>
+          </p:nvPr>
+        </p:nvSpPr>
+        <p:spPr/>
+        <p:txBody>
+          <a:bodyPr/>
+          <a:lstStyle/>
+          <a:p>
+            <a:fld id="{26F4831F-6F0E-43EF-BED8-BEEBB84EC01E}" type="slidenum">
+              <a:rPr lang="zh-CN" altLang="en-US" smtClean="0"/>
+              <a:t>4</a:t>
+            </a:fld>
+            <a:endParaRPr lang="zh-CN" altLang="en-US"/>
+          </a:p>
+        </p:txBody>
+      </p:sp>
+    </p:spTree>
+    <p:extLst>
+      <p:ext uri="{BB962C8B-B14F-4D97-AF65-F5344CB8AC3E}">
+        <p14:creationId xmlns:p14="http://schemas.microsoft.com/office/powerpoint/2010/main" val="1792054521"/>
+      </p:ext>
+    </p:extLst>
+  </p:cSld>
+  <p:clrMapOvr>
+    <a:masterClrMapping/>
+  </p:clrMapOvr>
+</p:notes>
+</file>
+
+<file path=ppt/notesSlides/notesSlide5.xml><?xml version="1.0" encoding="utf-8"?>
+<p:notes xmlns:a="http://schemas.openxmlformats.org/drawingml/2006/main" xmlns:r="http://schemas.openxmlformats.org/officeDocument/2006/relationships" xmlns:p="http://schemas.openxmlformats.org/presentationml/2006/main">
+  <p:cSld>
+    <p:spTree>
+      <p:nvGrpSpPr>
+        <p:cNvPr id="1" name=""/>
+        <p:cNvGrpSpPr/>
+        <p:nvPr/>
+      </p:nvGrpSpPr>
+      <p:grpSpPr>
+        <a:xfrm>
+          <a:off x="0" y="0"/>
+          <a:ext cx="0" cy="0"/>
+          <a:chOff x="0" y="0"/>
+          <a:chExt cx="0" cy="0"/>
+        </a:xfrm>
+      </p:grpSpPr>
+      <p:sp>
+        <p:nvSpPr>
+          <p:cNvPr id="2" name="幻灯片图像占位符 1"/>
+          <p:cNvSpPr>
+            <a:spLocks noGrp="1" noRot="1" noChangeAspect="1"/>
+          </p:cNvSpPr>
+          <p:nvPr>
+            <p:ph type="sldImg"/>
+          </p:nvPr>
+        </p:nvSpPr>
+        <p:spPr/>
+      </p:sp>
+      <p:sp>
+        <p:nvSpPr>
+          <p:cNvPr id="3" name="备注占位符 2"/>
+          <p:cNvSpPr>
+            <a:spLocks noGrp="1"/>
+          </p:cNvSpPr>
+          <p:nvPr>
+            <p:ph type="body" idx="1"/>
+          </p:nvPr>
+        </p:nvSpPr>
+        <p:spPr/>
+        <p:txBody>
+          <a:bodyPr/>
+          <a:lstStyle/>
+          <a:p>
+            <a:endParaRPr lang="zh-CN" altLang="en-US"/>
+          </a:p>
+        </p:txBody>
+      </p:sp>
+      <p:sp>
+        <p:nvSpPr>
+          <p:cNvPr id="4" name="灯片编号占位符 3"/>
+          <p:cNvSpPr>
+            <a:spLocks noGrp="1"/>
+          </p:cNvSpPr>
+          <p:nvPr>
+            <p:ph type="sldNum" sz="quarter" idx="10"/>
+          </p:nvPr>
+        </p:nvSpPr>
+        <p:spPr/>
+        <p:txBody>
+          <a:bodyPr/>
+          <a:lstStyle/>
+          <a:p>
+            <a:fld id="{26F4831F-6F0E-43EF-BED8-BEEBB84EC01E}" type="slidenum">
+              <a:rPr lang="zh-CN" altLang="en-US" smtClean="0"/>
+              <a:t>5</a:t>
+            </a:fld>
+            <a:endParaRPr lang="zh-CN" altLang="en-US"/>
+          </a:p>
+        </p:txBody>
+      </p:sp>
+    </p:spTree>
+    <p:extLst>
+      <p:ext uri="{BB962C8B-B14F-4D97-AF65-F5344CB8AC3E}">
+        <p14:creationId xmlns:p14="http://schemas.microsoft.com/office/powerpoint/2010/main" val="4018477300"/>
+      </p:ext>
+    </p:extLst>
+  </p:cSld>
+  <p:clrMapOvr>
+    <a:masterClrMapping/>
+  </p:clrMapOvr>
+</p:notes>
+</file>
+
+<file path=ppt/notesSlides/notesSlide6.xml><?xml version="1.0" encoding="utf-8"?>
+<p:notes xmlns:a="http://schemas.openxmlformats.org/drawingml/2006/main" xmlns:r="http://schemas.openxmlformats.org/officeDocument/2006/relationships" xmlns:p="http://schemas.openxmlformats.org/presentationml/2006/main">
+  <p:cSld>
+    <p:spTree>
+      <p:nvGrpSpPr>
+        <p:cNvPr id="1" name=""/>
+        <p:cNvGrpSpPr/>
+        <p:nvPr/>
+      </p:nvGrpSpPr>
+      <p:grpSpPr>
+        <a:xfrm>
+          <a:off x="0" y="0"/>
+          <a:ext cx="0" cy="0"/>
+          <a:chOff x="0" y="0"/>
+          <a:chExt cx="0" cy="0"/>
+        </a:xfrm>
+      </p:grpSpPr>
+      <p:sp>
+        <p:nvSpPr>
+          <p:cNvPr id="2" name="幻灯片图像占位符 1"/>
+          <p:cNvSpPr>
+            <a:spLocks noGrp="1" noRot="1" noChangeAspect="1"/>
+          </p:cNvSpPr>
+          <p:nvPr>
+            <p:ph type="sldImg"/>
+          </p:nvPr>
+        </p:nvSpPr>
+        <p:spPr/>
+      </p:sp>
+      <p:sp>
+        <p:nvSpPr>
+          <p:cNvPr id="3" name="备注占位符 2"/>
+          <p:cNvSpPr>
+            <a:spLocks noGrp="1"/>
+          </p:cNvSpPr>
+          <p:nvPr>
+            <p:ph type="body" idx="1"/>
+          </p:nvPr>
+        </p:nvSpPr>
+        <p:spPr/>
+        <p:txBody>
+          <a:bodyPr/>
+          <a:lstStyle/>
+          <a:p>
+            <a:endParaRPr lang="zh-CN" altLang="en-US"/>
+          </a:p>
+        </p:txBody>
+      </p:sp>
+      <p:sp>
+        <p:nvSpPr>
+          <p:cNvPr id="4" name="灯片编号占位符 3"/>
+          <p:cNvSpPr>
+            <a:spLocks noGrp="1"/>
+          </p:cNvSpPr>
+          <p:nvPr>
+            <p:ph type="sldNum" sz="quarter" idx="10"/>
+          </p:nvPr>
+        </p:nvSpPr>
+        <p:spPr/>
+        <p:txBody>
+          <a:bodyPr/>
+          <a:lstStyle/>
+          <a:p>
+            <a:fld id="{26F4831F-6F0E-43EF-BED8-BEEBB84EC01E}" type="slidenum">
+              <a:rPr lang="zh-CN" altLang="en-US" smtClean="0"/>
+              <a:t>6</a:t>
+            </a:fld>
+            <a:endParaRPr lang="zh-CN" altLang="en-US"/>
+          </a:p>
+        </p:txBody>
+      </p:sp>
+    </p:spTree>
+    <p:extLst>
+      <p:ext uri="{BB962C8B-B14F-4D97-AF65-F5344CB8AC3E}">
+        <p14:creationId xmlns:p14="http://schemas.microsoft.com/office/powerpoint/2010/main" val="1982539683"/>
+      </p:ext>
+    </p:extLst>
+  </p:cSld>
+  <p:clrMapOvr>
+    <a:masterClrMapping/>
+  </p:clrMapOvr>
+</p:notes>
+</file>
+
+<file path=ppt/notesSlides/notesSlide7.xml><?xml version="1.0" encoding="utf-8"?>
+<p:notes xmlns:a="http://schemas.openxmlformats.org/drawingml/2006/main" xmlns:r="http://schemas.openxmlformats.org/officeDocument/2006/relationships" xmlns:p="http://schemas.openxmlformats.org/presentationml/2006/main">
+  <p:cSld>
+    <p:spTree>
+      <p:nvGrpSpPr>
+        <p:cNvPr id="1" name=""/>
+        <p:cNvGrpSpPr/>
+        <p:nvPr/>
+      </p:nvGrpSpPr>
+      <p:grpSpPr>
+        <a:xfrm>
+          <a:off x="0" y="0"/>
+          <a:ext cx="0" cy="0"/>
+          <a:chOff x="0" y="0"/>
+          <a:chExt cx="0" cy="0"/>
+        </a:xfrm>
+      </p:grpSpPr>
+      <p:sp>
+        <p:nvSpPr>
+          <p:cNvPr id="2" name="幻灯片图像占位符 1"/>
+          <p:cNvSpPr>
+            <a:spLocks noGrp="1" noRot="1" noChangeAspect="1"/>
+          </p:cNvSpPr>
+          <p:nvPr>
+            <p:ph type="sldImg"/>
+          </p:nvPr>
+        </p:nvSpPr>
+        <p:spPr/>
+      </p:sp>
+      <p:sp>
+        <p:nvSpPr>
+          <p:cNvPr id="3" name="备注占位符 2"/>
+          <p:cNvSpPr>
+            <a:spLocks noGrp="1"/>
+          </p:cNvSpPr>
+          <p:nvPr>
+            <p:ph type="body" idx="1"/>
+          </p:nvPr>
+        </p:nvSpPr>
+        <p:spPr/>
+        <p:txBody>
+          <a:bodyPr/>
+          <a:lstStyle/>
+          <a:p>
             <a:endParaRPr lang="zh-CN" altLang="en-US" dirty="0"/>
           </a:p>
         </p:txBody>
@@ -4295,6 +6249,174 @@
     <p:extLst>
       <p:ext uri="{BB962C8B-B14F-4D97-AF65-F5344CB8AC3E}">
         <p14:creationId xmlns:p14="http://schemas.microsoft.com/office/powerpoint/2010/main" val="132839555"/>
+      </p:ext>
+    </p:extLst>
+  </p:cSld>
+  <p:clrMapOvr>
+    <a:masterClrMapping/>
+  </p:clrMapOvr>
+</p:notes>
+</file>
+
+<file path=ppt/notesSlides/notesSlide8.xml><?xml version="1.0" encoding="utf-8"?>
+<p:notes xmlns:a="http://schemas.openxmlformats.org/drawingml/2006/main" xmlns:r="http://schemas.openxmlformats.org/officeDocument/2006/relationships" xmlns:p="http://schemas.openxmlformats.org/presentationml/2006/main">
+  <p:cSld>
+    <p:spTree>
+      <p:nvGrpSpPr>
+        <p:cNvPr id="1" name=""/>
+        <p:cNvGrpSpPr/>
+        <p:nvPr/>
+      </p:nvGrpSpPr>
+      <p:grpSpPr>
+        <a:xfrm>
+          <a:off x="0" y="0"/>
+          <a:ext cx="0" cy="0"/>
+          <a:chOff x="0" y="0"/>
+          <a:chExt cx="0" cy="0"/>
+        </a:xfrm>
+      </p:grpSpPr>
+      <p:sp>
+        <p:nvSpPr>
+          <p:cNvPr id="2" name="幻灯片图像占位符 1"/>
+          <p:cNvSpPr>
+            <a:spLocks noGrp="1" noRot="1" noChangeAspect="1"/>
+          </p:cNvSpPr>
+          <p:nvPr>
+            <p:ph type="sldImg"/>
+          </p:nvPr>
+        </p:nvSpPr>
+        <p:spPr/>
+      </p:sp>
+      <p:sp>
+        <p:nvSpPr>
+          <p:cNvPr id="3" name="备注占位符 2"/>
+          <p:cNvSpPr>
+            <a:spLocks noGrp="1"/>
+          </p:cNvSpPr>
+          <p:nvPr>
+            <p:ph type="body" idx="1"/>
+          </p:nvPr>
+        </p:nvSpPr>
+        <p:spPr/>
+        <p:txBody>
+          <a:bodyPr/>
+          <a:lstStyle/>
+          <a:p>
+            <a:endParaRPr lang="zh-CN" altLang="en-US"/>
+          </a:p>
+        </p:txBody>
+      </p:sp>
+      <p:sp>
+        <p:nvSpPr>
+          <p:cNvPr id="4" name="灯片编号占位符 3"/>
+          <p:cNvSpPr>
+            <a:spLocks noGrp="1"/>
+          </p:cNvSpPr>
+          <p:nvPr>
+            <p:ph type="sldNum" sz="quarter" idx="10"/>
+          </p:nvPr>
+        </p:nvSpPr>
+        <p:spPr/>
+        <p:txBody>
+          <a:bodyPr/>
+          <a:lstStyle/>
+          <a:p>
+            <a:fld id="{26F4831F-6F0E-43EF-BED8-BEEBB84EC01E}" type="slidenum">
+              <a:rPr lang="zh-CN" altLang="en-US" smtClean="0"/>
+              <a:t>8</a:t>
+            </a:fld>
+            <a:endParaRPr lang="zh-CN" altLang="en-US"/>
+          </a:p>
+        </p:txBody>
+      </p:sp>
+    </p:spTree>
+    <p:extLst>
+      <p:ext uri="{BB962C8B-B14F-4D97-AF65-F5344CB8AC3E}">
+        <p14:creationId xmlns:p14="http://schemas.microsoft.com/office/powerpoint/2010/main" val="352858012"/>
+      </p:ext>
+    </p:extLst>
+  </p:cSld>
+  <p:clrMapOvr>
+    <a:masterClrMapping/>
+  </p:clrMapOvr>
+</p:notes>
+</file>
+
+<file path=ppt/notesSlides/notesSlide9.xml><?xml version="1.0" encoding="utf-8"?>
+<p:notes xmlns:a="http://schemas.openxmlformats.org/drawingml/2006/main" xmlns:r="http://schemas.openxmlformats.org/officeDocument/2006/relationships" xmlns:p="http://schemas.openxmlformats.org/presentationml/2006/main">
+  <p:cSld>
+    <p:spTree>
+      <p:nvGrpSpPr>
+        <p:cNvPr id="1" name=""/>
+        <p:cNvGrpSpPr/>
+        <p:nvPr/>
+      </p:nvGrpSpPr>
+      <p:grpSpPr>
+        <a:xfrm>
+          <a:off x="0" y="0"/>
+          <a:ext cx="0" cy="0"/>
+          <a:chOff x="0" y="0"/>
+          <a:chExt cx="0" cy="0"/>
+        </a:xfrm>
+      </p:grpSpPr>
+      <p:sp>
+        <p:nvSpPr>
+          <p:cNvPr id="2" name="幻灯片图像占位符 1"/>
+          <p:cNvSpPr>
+            <a:spLocks noGrp="1" noRot="1" noChangeAspect="1"/>
+          </p:cNvSpPr>
+          <p:nvPr>
+            <p:ph type="sldImg"/>
+          </p:nvPr>
+        </p:nvSpPr>
+        <p:spPr/>
+      </p:sp>
+      <p:sp>
+        <p:nvSpPr>
+          <p:cNvPr id="3" name="备注占位符 2"/>
+          <p:cNvSpPr>
+            <a:spLocks noGrp="1"/>
+          </p:cNvSpPr>
+          <p:nvPr>
+            <p:ph type="body" idx="1"/>
+          </p:nvPr>
+        </p:nvSpPr>
+        <p:spPr/>
+        <p:txBody>
+          <a:bodyPr/>
+          <a:lstStyle/>
+          <a:p>
+            <a:endParaRPr lang="zh-CN" altLang="en-US"/>
+          </a:p>
+        </p:txBody>
+      </p:sp>
+      <p:sp>
+        <p:nvSpPr>
+          <p:cNvPr id="4" name="灯片编号占位符 3"/>
+          <p:cNvSpPr>
+            <a:spLocks noGrp="1"/>
+          </p:cNvSpPr>
+          <p:nvPr>
+            <p:ph type="sldNum" sz="quarter" idx="10"/>
+          </p:nvPr>
+        </p:nvSpPr>
+        <p:spPr/>
+        <p:txBody>
+          <a:bodyPr/>
+          <a:lstStyle/>
+          <a:p>
+            <a:fld id="{26F4831F-6F0E-43EF-BED8-BEEBB84EC01E}" type="slidenum">
+              <a:rPr lang="zh-CN" altLang="en-US" smtClean="0"/>
+              <a:t>9</a:t>
+            </a:fld>
+            <a:endParaRPr lang="zh-CN" altLang="en-US"/>
+          </a:p>
+        </p:txBody>
+      </p:sp>
+    </p:spTree>
+    <p:extLst>
+      <p:ext uri="{BB962C8B-B14F-4D97-AF65-F5344CB8AC3E}">
+        <p14:creationId xmlns:p14="http://schemas.microsoft.com/office/powerpoint/2010/main" val="1315084960"/>
       </p:ext>
     </p:extLst>
   </p:cSld>
@@ -4485,7 +6607,7 @@
           <a:p>
             <a:fld id="{F06CDC8D-25DE-4581-BD3E-1D12832A0D0D}" type="datetimeFigureOut">
               <a:rPr lang="zh-CN" altLang="en-US" smtClean="0"/>
-              <a:t>2013/11/19</a:t>
+              <a:t>2013/11/20</a:t>
             </a:fld>
             <a:endParaRPr lang="zh-CN" altLang="en-US"/>
           </a:p>
@@ -4655,7 +6777,7 @@
           <a:p>
             <a:fld id="{F06CDC8D-25DE-4581-BD3E-1D12832A0D0D}" type="datetimeFigureOut">
               <a:rPr lang="zh-CN" altLang="en-US" smtClean="0"/>
-              <a:t>2013/11/19</a:t>
+              <a:t>2013/11/20</a:t>
             </a:fld>
             <a:endParaRPr lang="zh-CN" altLang="en-US"/>
           </a:p>
@@ -4835,7 +6957,7 @@
           <a:p>
             <a:fld id="{F06CDC8D-25DE-4581-BD3E-1D12832A0D0D}" type="datetimeFigureOut">
               <a:rPr lang="zh-CN" altLang="en-US" smtClean="0"/>
-              <a:t>2013/11/19</a:t>
+              <a:t>2013/11/20</a:t>
             </a:fld>
             <a:endParaRPr lang="zh-CN" altLang="en-US"/>
           </a:p>
@@ -5005,7 +7127,7 @@
           <a:p>
             <a:fld id="{F06CDC8D-25DE-4581-BD3E-1D12832A0D0D}" type="datetimeFigureOut">
               <a:rPr lang="zh-CN" altLang="en-US" smtClean="0"/>
-              <a:t>2013/11/19</a:t>
+              <a:t>2013/11/20</a:t>
             </a:fld>
             <a:endParaRPr lang="zh-CN" altLang="en-US"/>
           </a:p>
@@ -5251,7 +7373,7 @@
           <a:p>
             <a:fld id="{F06CDC8D-25DE-4581-BD3E-1D12832A0D0D}" type="datetimeFigureOut">
               <a:rPr lang="zh-CN" altLang="en-US" smtClean="0"/>
-              <a:t>2013/11/19</a:t>
+              <a:t>2013/11/20</a:t>
             </a:fld>
             <a:endParaRPr lang="zh-CN" altLang="en-US"/>
           </a:p>
@@ -5539,7 +7661,7 @@
           <a:p>
             <a:fld id="{F06CDC8D-25DE-4581-BD3E-1D12832A0D0D}" type="datetimeFigureOut">
               <a:rPr lang="zh-CN" altLang="en-US" smtClean="0"/>
-              <a:t>2013/11/19</a:t>
+              <a:t>2013/11/20</a:t>
             </a:fld>
             <a:endParaRPr lang="zh-CN" altLang="en-US"/>
           </a:p>
@@ -5961,7 +8083,7 @@
           <a:p>
             <a:fld id="{F06CDC8D-25DE-4581-BD3E-1D12832A0D0D}" type="datetimeFigureOut">
               <a:rPr lang="zh-CN" altLang="en-US" smtClean="0"/>
-              <a:t>2013/11/19</a:t>
+              <a:t>2013/11/20</a:t>
             </a:fld>
             <a:endParaRPr lang="zh-CN" altLang="en-US"/>
           </a:p>
@@ -6079,7 +8201,7 @@
           <a:p>
             <a:fld id="{F06CDC8D-25DE-4581-BD3E-1D12832A0D0D}" type="datetimeFigureOut">
               <a:rPr lang="zh-CN" altLang="en-US" smtClean="0"/>
-              <a:t>2013/11/19</a:t>
+              <a:t>2013/11/20</a:t>
             </a:fld>
             <a:endParaRPr lang="zh-CN" altLang="en-US"/>
           </a:p>
@@ -6174,7 +8296,7 @@
           <a:p>
             <a:fld id="{F06CDC8D-25DE-4581-BD3E-1D12832A0D0D}" type="datetimeFigureOut">
               <a:rPr lang="zh-CN" altLang="en-US" smtClean="0"/>
-              <a:t>2013/11/19</a:t>
+              <a:t>2013/11/20</a:t>
             </a:fld>
             <a:endParaRPr lang="zh-CN" altLang="en-US"/>
           </a:p>
@@ -6451,7 +8573,7 @@
           <a:p>
             <a:fld id="{F06CDC8D-25DE-4581-BD3E-1D12832A0D0D}" type="datetimeFigureOut">
               <a:rPr lang="zh-CN" altLang="en-US" smtClean="0"/>
-              <a:t>2013/11/19</a:t>
+              <a:t>2013/11/20</a:t>
             </a:fld>
             <a:endParaRPr lang="zh-CN" altLang="en-US"/>
           </a:p>
@@ -6704,7 +8826,7 @@
           <a:p>
             <a:fld id="{F06CDC8D-25DE-4581-BD3E-1D12832A0D0D}" type="datetimeFigureOut">
               <a:rPr lang="zh-CN" altLang="en-US" smtClean="0"/>
-              <a:t>2013/11/19</a:t>
+              <a:t>2013/11/20</a:t>
             </a:fld>
             <a:endParaRPr lang="zh-CN" altLang="en-US"/>
           </a:p>
@@ -6917,7 +9039,7 @@
           <a:p>
             <a:fld id="{F06CDC8D-25DE-4581-BD3E-1D12832A0D0D}" type="datetimeFigureOut">
               <a:rPr lang="zh-CN" altLang="en-US" smtClean="0"/>
-              <a:t>2013/11/19</a:t>
+              <a:t>2013/11/20</a:t>
             </a:fld>
             <a:endParaRPr lang="zh-CN" altLang="en-US"/>
           </a:p>
@@ -7469,7 +9591,7 @@
           <p:nvPr/>
         </p:nvPicPr>
         <p:blipFill>
-          <a:blip r:embed="rId2"/>
+          <a:blip r:embed="rId3"/>
           <a:stretch>
             <a:fillRect/>
           </a:stretch>
@@ -7845,7 +9967,7 @@
           </p:nvPr>
         </p:nvPicPr>
         <p:blipFill>
-          <a:blip r:embed="rId2"/>
+          <a:blip r:embed="rId3"/>
           <a:stretch>
             <a:fillRect/>
           </a:stretch>
@@ -8529,7 +10651,7 @@
           <p:nvPr/>
         </p:nvPicPr>
         <p:blipFill>
-          <a:blip r:embed="rId2"/>
+          <a:blip r:embed="rId3"/>
           <a:stretch>
             <a:fillRect/>
           </a:stretch>
@@ -9052,7 +11174,7 @@
           <p:nvPr/>
         </p:nvPicPr>
         <p:blipFill>
-          <a:blip r:embed="rId2"/>
+          <a:blip r:embed="rId3"/>
           <a:stretch>
             <a:fillRect/>
           </a:stretch>
@@ -9530,7 +11652,7 @@
           <p:nvPr/>
         </p:nvPicPr>
         <p:blipFill>
-          <a:blip r:embed="rId2"/>
+          <a:blip r:embed="rId3"/>
           <a:stretch>
             <a:fillRect/>
           </a:stretch>
@@ -9934,7 +12056,7 @@
           <p:nvPr/>
         </p:nvPicPr>
         <p:blipFill>
-          <a:blip r:embed="rId2"/>
+          <a:blip r:embed="rId3"/>
           <a:stretch>
             <a:fillRect/>
           </a:stretch>
@@ -10140,7 +12262,7 @@
           <p:nvPr/>
         </p:nvPicPr>
         <p:blipFill>
-          <a:blip r:embed="rId2">
+          <a:blip r:embed="rId3">
             <a:extLst>
               <a:ext uri="{28A0092B-C50C-407E-A947-70E740481C1C}">
                 <a14:useLocalDpi xmlns:a14="http://schemas.microsoft.com/office/drawing/2010/main" val="0"/>
@@ -10910,11 +13032,11 @@
           <a:p>
             <a:r>
               <a:rPr lang="zh-CN" altLang="en-US" dirty="0" smtClean="0"/>
-              <a:t>动手实验</a:t>
-            </a:r>
-            <a:r>
-              <a:rPr lang="en-US" altLang="zh-CN" dirty="0" smtClean="0"/>
-              <a:t>1</a:t>
+              <a:t>动手</a:t>
+            </a:r>
+            <a:r>
+              <a:rPr lang="zh-CN" altLang="en-US" dirty="0" smtClean="0"/>
+              <a:t>实验</a:t>
             </a:r>
             <a:endParaRPr lang="zh-CN" altLang="en-US" dirty="0"/>
           </a:p>
@@ -11204,16 +13326,15 @@
           </p:cNvPicPr>
           <p:nvPr/>
         </p:nvPicPr>
-        <p:blipFill>
-          <a:blip r:embed="rId2"/>
-          <a:stretch>
-            <a:fillRect/>
-          </a:stretch>
+        <p:blipFill rotWithShape="1">
+          <a:blip r:embed="rId3"/>
+          <a:srcRect t="5939"/>
+          <a:stretch/>
         </p:blipFill>
         <p:spPr>
           <a:xfrm>
-            <a:off x="323528" y="1395933"/>
-            <a:ext cx="2520280" cy="5133475"/>
+            <a:off x="323528" y="1700808"/>
+            <a:ext cx="2520280" cy="4828600"/>
           </a:xfrm>
           <a:prstGeom prst="rect">
             <a:avLst/>
@@ -11779,37 +13900,37 @@
             </a:r>
             <a:r>
               <a:rPr lang="en-US" altLang="zh-CN" sz="2800" dirty="0">
-                <a:hlinkClick r:id="rId2"/>
+                <a:hlinkClick r:id="rId3"/>
               </a:rPr>
               <a:t>http</a:t>
             </a:r>
             <a:r>
               <a:rPr lang="en-US" altLang="zh-CN" sz="2800" dirty="0" smtClean="0">
-                <a:hlinkClick r:id="rId2"/>
+                <a:hlinkClick r:id="rId3"/>
               </a:rPr>
               <a:t>://.../</a:t>
             </a:r>
             <a:r>
               <a:rPr lang="en-US" altLang="zh-CN" sz="2800" dirty="0" err="1">
-                <a:hlinkClick r:id="rId2"/>
+                <a:hlinkClick r:id="rId3"/>
               </a:rPr>
               <a:t>solr</a:t>
             </a:r>
             <a:r>
               <a:rPr lang="en-US" altLang="zh-CN" sz="2800" dirty="0">
-                <a:hlinkClick r:id="rId2"/>
+                <a:hlinkClick r:id="rId3"/>
               </a:rPr>
               <a:t>/collection1/</a:t>
             </a:r>
             <a:r>
               <a:rPr lang="en-US" altLang="zh-CN" sz="2800" dirty="0" err="1">
-                <a:hlinkClick r:id="rId2"/>
+                <a:hlinkClick r:id="rId3"/>
               </a:rPr>
               <a:t>select?q</a:t>
             </a:r>
             <a:r>
               <a:rPr lang="en-US" altLang="zh-CN" sz="2800" dirty="0" smtClean="0">
-                <a:hlinkClick r:id="rId2"/>
+                <a:hlinkClick r:id="rId3"/>
               </a:rPr>
               <a:t>=&lt;search</a:t>
             </a:r>
@@ -11957,7 +14078,7 @@
           <p:nvPr/>
         </p:nvPicPr>
         <p:blipFill>
-          <a:blip r:embed="rId3"/>
+          <a:blip r:embed="rId4"/>
           <a:stretch>
             <a:fillRect/>
           </a:stretch>
@@ -13439,8 +15560,8 @@
               <a:t>添加 </a:t>
             </a:r>
             <a:r>
-              <a:rPr lang="en-US" altLang="zh-CN" dirty="0"/>
-              <a:t>solr-dataimporthandler-4.4.0.jar</a:t>
+              <a:rPr lang="en-US" altLang="zh-CN" dirty="0" smtClean="0"/>
+              <a:t>solr-dataimporthandler-4.5.1.jar</a:t>
             </a:r>
             <a:r>
               <a:rPr lang="zh-CN" altLang="en-US" dirty="0"/>
@@ -15424,7 +17545,7 @@
           </p:nvPr>
         </p:nvPicPr>
         <p:blipFill>
-          <a:blip r:embed="rId2">
+          <a:blip r:embed="rId3">
             <a:extLst>
               <a:ext uri="{28A0092B-C50C-407E-A947-70E740481C1C}">
                 <a14:useLocalDpi xmlns:a14="http://schemas.microsoft.com/office/drawing/2010/main" val="0"/>
@@ -16313,7 +18434,7 @@
         </p:xfrm>
         <a:graphic>
           <a:graphicData uri="http://schemas.openxmlformats.org/drawingml/2006/diagram">
-            <dgm:relIds xmlns:dgm="http://schemas.openxmlformats.org/drawingml/2006/diagram" xmlns:r="http://schemas.openxmlformats.org/officeDocument/2006/relationships" r:dm="rId2" r:lo="rId3" r:qs="rId4" r:cs="rId5"/>
+            <dgm:relIds xmlns:dgm="http://schemas.openxmlformats.org/drawingml/2006/diagram" xmlns:r="http://schemas.openxmlformats.org/officeDocument/2006/relationships" r:dm="rId3" r:lo="rId4" r:qs="rId5" r:cs="rId6"/>
           </a:graphicData>
         </a:graphic>
       </p:graphicFrame>
@@ -17947,7 +20068,7 @@
           <a:p>
             <a:r>
               <a:rPr lang="zh-CN" altLang="en-US" sz="2000" dirty="0">
-                <a:hlinkClick r:id="rId2"/>
+                <a:hlinkClick r:id="rId3"/>
               </a:rPr>
               <a:t>http://www.cnblogs.com/forfuture1978/archive/2009/12/14/1623597.html</a:t>
             </a:r>
@@ -18974,7 +21095,7 @@
           <p:nvPr/>
         </p:nvPicPr>
         <p:blipFill>
-          <a:blip r:embed="rId2">
+          <a:blip r:embed="rId3">
             <a:extLst>
               <a:ext uri="{28A0092B-C50C-407E-A947-70E740481C1C}">
                 <a14:useLocalDpi xmlns:a14="http://schemas.microsoft.com/office/drawing/2010/main" val="0"/>
@@ -19004,7 +21125,7 @@
           <p:nvPr/>
         </p:nvPicPr>
         <p:blipFill>
-          <a:blip r:embed="rId3">
+          <a:blip r:embed="rId4">
             <a:extLst>
               <a:ext uri="{28A0092B-C50C-407E-A947-70E740481C1C}">
                 <a14:useLocalDpi xmlns:a14="http://schemas.microsoft.com/office/drawing/2010/main" val="0"/>

</xml_diff>